<commit_message>
Update PutShipCommand sequence diagrams
Add footer explaining what <args> means.
</commit_message>
<xml_diff>
--- a/docs/diagrams/PutShipSequenceDiagram.pptx
+++ b/docs/diagrams/PutShipSequenceDiagram.pptx
@@ -129,7 +129,7 @@
 <file path=ppt/revisionInfo.xml><?xml version="1.0" encoding="utf-8"?>
 <p1510:revInfo xmlns:a="http://schemas.openxmlformats.org/drawingml/2006/main" xmlns:r="http://schemas.openxmlformats.org/officeDocument/2006/relationships" xmlns:p1510="http://schemas.microsoft.com/office/powerpoint/2015/10/main">
   <p1510:revLst>
-    <p1510:client id="{25B0B48C-3155-344C-9C5D-EB0F11A61745}" v="33" dt="2019-03-29T12:17:56.612"/>
+    <p1510:client id="{25B0B48C-3155-344C-9C5D-EB0F11A61745}" v="34" dt="2019-03-29T12:22:17.171"/>
   </p1510:revLst>
 </p1510:revInfo>
 </file>
@@ -139,12 +139,12 @@
   <pc:docChgLst>
     <pc:chgData name="Ian Wu Ling En" userId="28715549-2f5c-46f8-b7f8-f39c35f3312d" providerId="ADAL" clId="{25B0B48C-3155-344C-9C5D-EB0F11A61745}"/>
     <pc:docChg chg="undo redo custSel addSld delSld modSld modMainMaster">
-      <pc:chgData name="Ian Wu Ling En" userId="28715549-2f5c-46f8-b7f8-f39c35f3312d" providerId="ADAL" clId="{25B0B48C-3155-344C-9C5D-EB0F11A61745}" dt="2019-03-29T12:19:37.053" v="599" actId="1037"/>
+      <pc:chgData name="Ian Wu Ling En" userId="28715549-2f5c-46f8-b7f8-f39c35f3312d" providerId="ADAL" clId="{25B0B48C-3155-344C-9C5D-EB0F11A61745}" dt="2019-03-29T12:22:51.733" v="656" actId="20577"/>
       <pc:docMkLst>
         <pc:docMk/>
       </pc:docMkLst>
       <pc:sldChg chg="addSp delSp modSp">
-        <pc:chgData name="Ian Wu Ling En" userId="28715549-2f5c-46f8-b7f8-f39c35f3312d" providerId="ADAL" clId="{25B0B48C-3155-344C-9C5D-EB0F11A61745}" dt="2019-03-29T12:19:37.053" v="599" actId="1037"/>
+        <pc:chgData name="Ian Wu Ling En" userId="28715549-2f5c-46f8-b7f8-f39c35f3312d" providerId="ADAL" clId="{25B0B48C-3155-344C-9C5D-EB0F11A61745}" dt="2019-03-29T12:22:51.733" v="656" actId="20577"/>
         <pc:sldMkLst>
           <pc:docMk/>
           <pc:sldMk cId="3945898909" sldId="267"/>
@@ -251,6 +251,14 @@
             <pc:docMk/>
             <pc:sldMk cId="3945898909" sldId="267"/>
             <ac:spMk id="56" creationId="{00000000-0000-0000-0000-000000000000}"/>
+          </ac:spMkLst>
+        </pc:spChg>
+        <pc:spChg chg="add mod">
+          <ac:chgData name="Ian Wu Ling En" userId="28715549-2f5c-46f8-b7f8-f39c35f3312d" providerId="ADAL" clId="{25B0B48C-3155-344C-9C5D-EB0F11A61745}" dt="2019-03-29T12:22:51.733" v="656" actId="20577"/>
+          <ac:spMkLst>
+            <pc:docMk/>
+            <pc:sldMk cId="3945898909" sldId="267"/>
+            <ac:spMk id="61" creationId="{A6AA3A69-FF3B-4544-9DE5-D79C590BA53D}"/>
           </ac:spMkLst>
         </pc:spChg>
         <pc:spChg chg="add del mod">
@@ -7276,6 +7284,61 @@
           </a:fontRef>
         </p:style>
       </p:cxnSp>
+      <p:sp>
+        <p:nvSpPr>
+          <p:cNvPr id="61" name="TextBox 60">
+            <a:extLst>
+              <a:ext uri="{FF2B5EF4-FFF2-40B4-BE49-F238E27FC236}">
+                <a16:creationId xmlns:a16="http://schemas.microsoft.com/office/drawing/2014/main" id="{A6AA3A69-FF3B-4544-9DE5-D79C590BA53D}"/>
+              </a:ext>
+            </a:extLst>
+          </p:cNvPr>
+          <p:cNvSpPr txBox="1"/>
+          <p:nvPr/>
+        </p:nvSpPr>
+        <p:spPr>
+          <a:xfrm>
+            <a:off x="294013" y="6533668"/>
+            <a:ext cx="9254858" cy="220916"/>
+          </a:xfrm>
+          <a:prstGeom prst="rect">
+            <a:avLst/>
+          </a:prstGeom>
+          <a:noFill/>
+        </p:spPr>
+        <p:txBody>
+          <a:bodyPr wrap="square" lIns="0" tIns="0" rIns="0" bIns="0" rtlCol="0">
+            <a:spAutoFit/>
+          </a:bodyPr>
+          <a:lstStyle/>
+          <a:p>
+            <a:r>
+              <a:rPr lang="en-US" sz="1400" dirty="0">
+                <a:solidFill>
+                  <a:srgbClr val="0070C0"/>
+                </a:solidFill>
+              </a:rPr>
+              <a:t>&lt;</a:t>
+            </a:r>
+            <a:r>
+              <a:rPr lang="en-US" sz="1400" dirty="0" err="1">
+                <a:solidFill>
+                  <a:srgbClr val="0070C0"/>
+                </a:solidFill>
+              </a:rPr>
+              <a:t>args</a:t>
+            </a:r>
+            <a:r>
+              <a:rPr lang="en-US" sz="1400" dirty="0">
+                <a:solidFill>
+                  <a:srgbClr val="0070C0"/>
+                </a:solidFill>
+              </a:rPr>
+              <a:t>&gt; = n/destroyer c/a1 r/vertical t/tag</a:t>
+            </a:r>
+          </a:p>
+        </p:txBody>
+      </p:sp>
     </p:spTree>
     <p:extLst>
       <p:ext uri="{BB962C8B-B14F-4D97-AF65-F5344CB8AC3E}">

</xml_diff>

<commit_message>
Update sequence diagram for PutShip
</commit_message>
<xml_diff>
--- a/docs/diagrams/PutShipSequenceDiagram.pptx
+++ b/docs/diagrams/PutShipSequenceDiagram.pptx
@@ -129,7 +129,7 @@
 <file path=ppt/revisionInfo.xml><?xml version="1.0" encoding="utf-8"?>
 <p1510:revInfo xmlns:a="http://schemas.openxmlformats.org/drawingml/2006/main" xmlns:r="http://schemas.openxmlformats.org/officeDocument/2006/relationships" xmlns:p1510="http://schemas.microsoft.com/office/powerpoint/2015/10/main">
   <p1510:revLst>
-    <p1510:client id="{25B0B48C-3155-344C-9C5D-EB0F11A61745}" v="34" dt="2019-03-29T12:22:17.171"/>
+    <p1510:client id="{E7B3513D-77CA-6A41-910B-0B9402F691A1}" v="1" dt="2019-04-05T01:25:36.917"/>
   </p1510:revLst>
 </p1510:revInfo>
 </file>
@@ -709,44 +709,6 @@
             <ac:cxnSpMk id="250" creationId="{4905E054-6CE5-4BC2-AEFD-9C5C8BAA5AFA}"/>
           </ac:cxnSpMkLst>
         </pc:cxnChg>
-      </pc:sldChg>
-      <pc:sldChg chg="addSp delSp add del">
-        <pc:chgData name="Ian Wu Ling En" userId="28715549-2f5c-46f8-b7f8-f39c35f3312d" providerId="ADAL" clId="{25B0B48C-3155-344C-9C5D-EB0F11A61745}" dt="2019-03-29T11:37:26.011" v="240"/>
-        <pc:sldMkLst>
-          <pc:docMk/>
-          <pc:sldMk cId="2636235022" sldId="268"/>
-        </pc:sldMkLst>
-        <pc:spChg chg="add del">
-          <ac:chgData name="Ian Wu Ling En" userId="28715549-2f5c-46f8-b7f8-f39c35f3312d" providerId="ADAL" clId="{25B0B48C-3155-344C-9C5D-EB0F11A61745}" dt="2019-03-29T11:37:24.730" v="239"/>
-          <ac:spMkLst>
-            <pc:docMk/>
-            <pc:sldMk cId="2636235022" sldId="268"/>
-            <ac:spMk id="2" creationId="{129F05A2-FECA-A04A-875C-C7C58D8FAC8A}"/>
-          </ac:spMkLst>
-        </pc:spChg>
-      </pc:sldChg>
-      <pc:sldChg chg="addSp modSp add del">
-        <pc:chgData name="Ian Wu Ling En" userId="28715549-2f5c-46f8-b7f8-f39c35f3312d" providerId="ADAL" clId="{25B0B48C-3155-344C-9C5D-EB0F11A61745}" dt="2019-03-29T12:18:10.395" v="566" actId="2696"/>
-        <pc:sldMkLst>
-          <pc:docMk/>
-          <pc:sldMk cId="2769017902" sldId="268"/>
-        </pc:sldMkLst>
-        <pc:spChg chg="add mod">
-          <ac:chgData name="Ian Wu Ling En" userId="28715549-2f5c-46f8-b7f8-f39c35f3312d" providerId="ADAL" clId="{25B0B48C-3155-344C-9C5D-EB0F11A61745}" dt="2019-03-29T12:17:56.612" v="564"/>
-          <ac:spMkLst>
-            <pc:docMk/>
-            <pc:sldMk cId="2769017902" sldId="268"/>
-            <ac:spMk id="2" creationId="{EB11991A-9D9B-4D44-B55A-8F2986A2818F}"/>
-          </ac:spMkLst>
-        </pc:spChg>
-        <pc:spChg chg="add mod">
-          <ac:chgData name="Ian Wu Ling En" userId="28715549-2f5c-46f8-b7f8-f39c35f3312d" providerId="ADAL" clId="{25B0B48C-3155-344C-9C5D-EB0F11A61745}" dt="2019-03-29T12:17:56.612" v="564"/>
-          <ac:spMkLst>
-            <pc:docMk/>
-            <pc:sldMk cId="2769017902" sldId="268"/>
-            <ac:spMk id="3" creationId="{D4FA32F3-EE6C-9C40-A48A-ED8BB4BDE1FD}"/>
-          </ac:spMkLst>
-        </pc:spChg>
       </pc:sldChg>
       <pc:sldMasterChg chg="modSp modSldLayout">
         <pc:chgData name="Ian Wu Ling En" userId="28715549-2f5c-46f8-b7f8-f39c35f3312d" providerId="ADAL" clId="{25B0B48C-3155-344C-9C5D-EB0F11A61745}" dt="2019-03-29T12:17:56.612" v="564"/>
@@ -1015,6 +977,78 @@
       </pc:sldMasterChg>
     </pc:docChg>
   </pc:docChgLst>
+  <pc:docChgLst>
+    <pc:chgData name="Ian Wu Ling En" userId="28715549-2f5c-46f8-b7f8-f39c35f3312d" providerId="ADAL" clId="{E7B3513D-77CA-6A41-910B-0B9402F691A1}"/>
+    <pc:docChg chg="undo custSel modSld">
+      <pc:chgData name="Ian Wu Ling En" userId="28715549-2f5c-46f8-b7f8-f39c35f3312d" providerId="ADAL" clId="{E7B3513D-77CA-6A41-910B-0B9402F691A1}" dt="2019-04-05T01:25:44.900" v="38" actId="1076"/>
+      <pc:docMkLst>
+        <pc:docMk/>
+      </pc:docMkLst>
+      <pc:sldChg chg="addSp delSp modSp">
+        <pc:chgData name="Ian Wu Ling En" userId="28715549-2f5c-46f8-b7f8-f39c35f3312d" providerId="ADAL" clId="{E7B3513D-77CA-6A41-910B-0B9402F691A1}" dt="2019-04-05T01:25:44.900" v="38" actId="1076"/>
+        <pc:sldMkLst>
+          <pc:docMk/>
+          <pc:sldMk cId="3945898909" sldId="267"/>
+        </pc:sldMkLst>
+        <pc:cxnChg chg="mod">
+          <ac:chgData name="Ian Wu Ling En" userId="28715549-2f5c-46f8-b7f8-f39c35f3312d" providerId="ADAL" clId="{E7B3513D-77CA-6A41-910B-0B9402F691A1}" dt="2019-04-05T01:25:05.747" v="23" actId="14100"/>
+          <ac:cxnSpMkLst>
+            <pc:docMk/>
+            <pc:sldMk cId="3945898909" sldId="267"/>
+            <ac:cxnSpMk id="13" creationId="{00000000-0000-0000-0000-000000000000}"/>
+          </ac:cxnSpMkLst>
+        </pc:cxnChg>
+        <pc:cxnChg chg="mod">
+          <ac:chgData name="Ian Wu Ling En" userId="28715549-2f5c-46f8-b7f8-f39c35f3312d" providerId="ADAL" clId="{E7B3513D-77CA-6A41-910B-0B9402F691A1}" dt="2019-04-05T01:24:36.467" v="16" actId="14100"/>
+          <ac:cxnSpMkLst>
+            <pc:docMk/>
+            <pc:sldMk cId="3945898909" sldId="267"/>
+            <ac:cxnSpMk id="74" creationId="{8EE03F7A-2058-6749-A748-E895D05F30BE}"/>
+          </ac:cxnSpMkLst>
+        </pc:cxnChg>
+        <pc:cxnChg chg="del">
+          <ac:chgData name="Ian Wu Ling En" userId="28715549-2f5c-46f8-b7f8-f39c35f3312d" providerId="ADAL" clId="{E7B3513D-77CA-6A41-910B-0B9402F691A1}" dt="2019-04-05T01:25:36.431" v="35" actId="478"/>
+          <ac:cxnSpMkLst>
+            <pc:docMk/>
+            <pc:sldMk cId="3945898909" sldId="267"/>
+            <ac:cxnSpMk id="75" creationId="{1815E438-CD85-F845-BED3-9BA12D9BA5E4}"/>
+          </ac:cxnSpMkLst>
+        </pc:cxnChg>
+        <pc:cxnChg chg="add mod">
+          <ac:chgData name="Ian Wu Ling En" userId="28715549-2f5c-46f8-b7f8-f39c35f3312d" providerId="ADAL" clId="{E7B3513D-77CA-6A41-910B-0B9402F691A1}" dt="2019-04-05T01:25:40.994" v="37" actId="1076"/>
+          <ac:cxnSpMkLst>
+            <pc:docMk/>
+            <pc:sldMk cId="3945898909" sldId="267"/>
+            <ac:cxnSpMk id="88" creationId="{92348BEA-70E7-7E48-83EB-D9A4C68B91F9}"/>
+          </ac:cxnSpMkLst>
+        </pc:cxnChg>
+        <pc:cxnChg chg="mod">
+          <ac:chgData name="Ian Wu Ling En" userId="28715549-2f5c-46f8-b7f8-f39c35f3312d" providerId="ADAL" clId="{E7B3513D-77CA-6A41-910B-0B9402F691A1}" dt="2019-04-05T01:25:31.146" v="34" actId="14100"/>
+          <ac:cxnSpMkLst>
+            <pc:docMk/>
+            <pc:sldMk cId="3945898909" sldId="267"/>
+            <ac:cxnSpMk id="166" creationId="{20564365-3E4F-4EBD-914E-158225A41DAC}"/>
+          </ac:cxnSpMkLst>
+        </pc:cxnChg>
+        <pc:cxnChg chg="mod">
+          <ac:chgData name="Ian Wu Ling En" userId="28715549-2f5c-46f8-b7f8-f39c35f3312d" providerId="ADAL" clId="{E7B3513D-77CA-6A41-910B-0B9402F691A1}" dt="2019-04-05T01:25:44.900" v="38" actId="1076"/>
+          <ac:cxnSpMkLst>
+            <pc:docMk/>
+            <pc:sldMk cId="3945898909" sldId="267"/>
+            <ac:cxnSpMk id="201" creationId="{AE14F7A1-D82E-4019-B4DA-BA8F13C7DB36}"/>
+          </ac:cxnSpMkLst>
+        </pc:cxnChg>
+        <pc:cxnChg chg="mod">
+          <ac:chgData name="Ian Wu Ling En" userId="28715549-2f5c-46f8-b7f8-f39c35f3312d" providerId="ADAL" clId="{E7B3513D-77CA-6A41-910B-0B9402F691A1}" dt="2019-04-05T01:24:20.382" v="11" actId="14100"/>
+          <ac:cxnSpMkLst>
+            <pc:docMk/>
+            <pc:sldMk cId="3945898909" sldId="267"/>
+            <ac:cxnSpMk id="250" creationId="{4905E054-6CE5-4BC2-AEFD-9C5C8BAA5AFA}"/>
+          </ac:cxnSpMkLst>
+        </pc:cxnChg>
+      </pc:sldChg>
+    </pc:docChg>
+  </pc:docChgLst>
 </pc:chgInfo>
 </file>
 
@@ -1100,7 +1134,7 @@
           <a:p>
             <a:fld id="{F5CC4B3F-88C1-4FFA-B1B6-F41C21DC6924}" type="datetimeFigureOut">
               <a:rPr lang="en-US" smtClean="0"/>
-              <a:t>3/29/19</a:t>
+              <a:t>4/5/19</a:t>
             </a:fld>
             <a:endParaRPr lang="en-US" dirty="0"/>
           </a:p>
@@ -1546,7 +1580,7 @@
           <a:p>
             <a:fld id="{78C97017-6FC3-485B-9764-EAC9E56C1D49}" type="datetimeFigureOut">
               <a:rPr lang="en-US" smtClean="0"/>
-              <a:t>3/29/19</a:t>
+              <a:t>4/5/19</a:t>
             </a:fld>
             <a:endParaRPr lang="en-US" dirty="0"/>
           </a:p>
@@ -1714,7 +1748,7 @@
           <a:p>
             <a:fld id="{78C97017-6FC3-485B-9764-EAC9E56C1D49}" type="datetimeFigureOut">
               <a:rPr lang="en-US" smtClean="0"/>
-              <a:t>3/29/19</a:t>
+              <a:t>4/5/19</a:t>
             </a:fld>
             <a:endParaRPr lang="en-US" dirty="0"/>
           </a:p>
@@ -1892,7 +1926,7 @@
           <a:p>
             <a:fld id="{78C97017-6FC3-485B-9764-EAC9E56C1D49}" type="datetimeFigureOut">
               <a:rPr lang="en-US" smtClean="0"/>
-              <a:t>3/29/19</a:t>
+              <a:t>4/5/19</a:t>
             </a:fld>
             <a:endParaRPr lang="en-US" dirty="0"/>
           </a:p>
@@ -2060,7 +2094,7 @@
           <a:p>
             <a:fld id="{78C97017-6FC3-485B-9764-EAC9E56C1D49}" type="datetimeFigureOut">
               <a:rPr lang="en-US" smtClean="0"/>
-              <a:t>3/29/19</a:t>
+              <a:t>4/5/19</a:t>
             </a:fld>
             <a:endParaRPr lang="en-US" dirty="0"/>
           </a:p>
@@ -2305,7 +2339,7 @@
           <a:p>
             <a:fld id="{78C97017-6FC3-485B-9764-EAC9E56C1D49}" type="datetimeFigureOut">
               <a:rPr lang="en-US" smtClean="0"/>
-              <a:t>3/29/19</a:t>
+              <a:t>4/5/19</a:t>
             </a:fld>
             <a:endParaRPr lang="en-US" dirty="0"/>
           </a:p>
@@ -2590,7 +2624,7 @@
           <a:p>
             <a:fld id="{78C97017-6FC3-485B-9764-EAC9E56C1D49}" type="datetimeFigureOut">
               <a:rPr lang="en-US" smtClean="0"/>
-              <a:t>3/29/19</a:t>
+              <a:t>4/5/19</a:t>
             </a:fld>
             <a:endParaRPr lang="en-US" dirty="0"/>
           </a:p>
@@ -3009,7 +3043,7 @@
           <a:p>
             <a:fld id="{78C97017-6FC3-485B-9764-EAC9E56C1D49}" type="datetimeFigureOut">
               <a:rPr lang="en-US" smtClean="0"/>
-              <a:t>3/29/19</a:t>
+              <a:t>4/5/19</a:t>
             </a:fld>
             <a:endParaRPr lang="en-US" dirty="0"/>
           </a:p>
@@ -3126,7 +3160,7 @@
           <a:p>
             <a:fld id="{78C97017-6FC3-485B-9764-EAC9E56C1D49}" type="datetimeFigureOut">
               <a:rPr lang="en-US" smtClean="0"/>
-              <a:t>3/29/19</a:t>
+              <a:t>4/5/19</a:t>
             </a:fld>
             <a:endParaRPr lang="en-US" dirty="0"/>
           </a:p>
@@ -3221,7 +3255,7 @@
           <a:p>
             <a:fld id="{78C97017-6FC3-485B-9764-EAC9E56C1D49}" type="datetimeFigureOut">
               <a:rPr lang="en-US" smtClean="0"/>
-              <a:t>3/29/19</a:t>
+              <a:t>4/5/19</a:t>
             </a:fld>
             <a:endParaRPr lang="en-US" dirty="0"/>
           </a:p>
@@ -3496,7 +3530,7 @@
           <a:p>
             <a:fld id="{78C97017-6FC3-485B-9764-EAC9E56C1D49}" type="datetimeFigureOut">
               <a:rPr lang="en-US" smtClean="0"/>
-              <a:t>3/29/19</a:t>
+              <a:t>4/5/19</a:t>
             </a:fld>
             <a:endParaRPr lang="en-US" dirty="0"/>
           </a:p>
@@ -3748,7 +3782,7 @@
           <a:p>
             <a:fld id="{78C97017-6FC3-485B-9764-EAC9E56C1D49}" type="datetimeFigureOut">
               <a:rPr lang="en-US" smtClean="0"/>
-              <a:t>3/29/19</a:t>
+              <a:t>4/5/19</a:t>
             </a:fld>
             <a:endParaRPr lang="en-US" dirty="0"/>
           </a:p>
@@ -3959,7 +3993,7 @@
           <a:p>
             <a:fld id="{78C97017-6FC3-485B-9764-EAC9E56C1D49}" type="datetimeFigureOut">
               <a:rPr lang="en-US" smtClean="0"/>
-              <a:t>3/29/19</a:t>
+              <a:t>4/5/19</a:t>
             </a:fld>
             <a:endParaRPr lang="en-US" dirty="0"/>
           </a:p>
@@ -5725,12 +5759,12 @@
         </p:nvCxnSpPr>
         <p:spPr>
           <a:xfrm>
-            <a:off x="10750798" y="3606510"/>
-            <a:ext cx="72937" cy="109922"/>
+            <a:off x="10703891" y="3632144"/>
+            <a:ext cx="134988" cy="109955"/>
           </a:xfrm>
           <a:prstGeom prst="curvedConnector3">
             <a:avLst>
-              <a:gd name="adj1" fmla="val 395134"/>
+              <a:gd name="adj1" fmla="val 291588"/>
             </a:avLst>
           </a:prstGeom>
           <a:ln>
@@ -6388,17 +6422,18 @@
           </p:cNvPr>
           <p:cNvCxnSpPr>
             <a:cxnSpLocks/>
+            <a:endCxn id="49" idx="3"/>
           </p:cNvCxnSpPr>
           <p:nvPr/>
         </p:nvCxnSpPr>
         <p:spPr>
-          <a:xfrm flipH="1">
-            <a:off x="10751758" y="3941849"/>
-            <a:ext cx="72953" cy="132809"/>
+          <a:xfrm rot="10800000" flipV="1">
+            <a:off x="10704088" y="3942212"/>
+            <a:ext cx="127009" cy="108247"/>
           </a:xfrm>
           <a:prstGeom prst="curvedConnector3">
             <a:avLst>
-              <a:gd name="adj1" fmla="val -313352"/>
+              <a:gd name="adj1" fmla="val -216834"/>
             </a:avLst>
           </a:prstGeom>
           <a:ln>
@@ -6664,7 +6699,7 @@
         </p:nvCxnSpPr>
         <p:spPr>
           <a:xfrm>
-            <a:off x="8070677" y="5105952"/>
+            <a:off x="8070677" y="5155950"/>
             <a:ext cx="4158635" cy="0"/>
           </a:xfrm>
           <a:prstGeom prst="straightConnector1">
@@ -7042,7 +7077,7 @@
         </p:nvCxnSpPr>
         <p:spPr>
           <a:xfrm>
-            <a:off x="8045611" y="4741365"/>
+            <a:off x="8045611" y="4703878"/>
             <a:ext cx="4183694" cy="0"/>
           </a:xfrm>
           <a:prstGeom prst="straightConnector1">
@@ -7207,12 +7242,12 @@
         </p:nvCxnSpPr>
         <p:spPr>
           <a:xfrm>
-            <a:off x="12386082" y="4686404"/>
-            <a:ext cx="72937" cy="109922"/>
+            <a:off x="12305506" y="4733068"/>
+            <a:ext cx="167219" cy="83872"/>
           </a:xfrm>
           <a:prstGeom prst="curvedConnector3">
             <a:avLst>
-              <a:gd name="adj1" fmla="val 395134"/>
+              <a:gd name="adj1" fmla="val 293035"/>
             </a:avLst>
           </a:prstGeom>
           <a:ln>
@@ -7237,12 +7272,67 @@
           </a:fontRef>
         </p:style>
       </p:cxnSp>
+      <p:sp>
+        <p:nvSpPr>
+          <p:cNvPr id="61" name="TextBox 60">
+            <a:extLst>
+              <a:ext uri="{FF2B5EF4-FFF2-40B4-BE49-F238E27FC236}">
+                <a16:creationId xmlns:a16="http://schemas.microsoft.com/office/drawing/2014/main" id="{A6AA3A69-FF3B-4544-9DE5-D79C590BA53D}"/>
+              </a:ext>
+            </a:extLst>
+          </p:cNvPr>
+          <p:cNvSpPr txBox="1"/>
+          <p:nvPr/>
+        </p:nvSpPr>
+        <p:spPr>
+          <a:xfrm>
+            <a:off x="294013" y="6533668"/>
+            <a:ext cx="9254858" cy="220916"/>
+          </a:xfrm>
+          <a:prstGeom prst="rect">
+            <a:avLst/>
+          </a:prstGeom>
+          <a:noFill/>
+        </p:spPr>
+        <p:txBody>
+          <a:bodyPr wrap="square" lIns="0" tIns="0" rIns="0" bIns="0" rtlCol="0">
+            <a:spAutoFit/>
+          </a:bodyPr>
+          <a:lstStyle/>
+          <a:p>
+            <a:r>
+              <a:rPr lang="en-US" sz="1400" dirty="0">
+                <a:solidFill>
+                  <a:srgbClr val="0070C0"/>
+                </a:solidFill>
+              </a:rPr>
+              <a:t>&lt;</a:t>
+            </a:r>
+            <a:r>
+              <a:rPr lang="en-US" sz="1400" dirty="0" err="1">
+                <a:solidFill>
+                  <a:srgbClr val="0070C0"/>
+                </a:solidFill>
+              </a:rPr>
+              <a:t>args</a:t>
+            </a:r>
+            <a:r>
+              <a:rPr lang="en-US" sz="1400" dirty="0">
+                <a:solidFill>
+                  <a:srgbClr val="0070C0"/>
+                </a:solidFill>
+              </a:rPr>
+              <a:t>&gt; = n/destroyer c/a1 r/vertical t/tag</a:t>
+            </a:r>
+          </a:p>
+        </p:txBody>
+      </p:sp>
       <p:cxnSp>
         <p:nvCxnSpPr>
-          <p:cNvPr id="75" name="Curved Connector 12">
+          <p:cNvPr id="88" name="Curved Connector 12">
             <a:extLst>
               <a:ext uri="{FF2B5EF4-FFF2-40B4-BE49-F238E27FC236}">
-                <a16:creationId xmlns:a16="http://schemas.microsoft.com/office/drawing/2014/main" id="{1815E438-CD85-F845-BED3-9BA12D9BA5E4}"/>
+                <a16:creationId xmlns:a16="http://schemas.microsoft.com/office/drawing/2014/main" id="{92348BEA-70E7-7E48-83EB-D9A4C68B91F9}"/>
               </a:ext>
             </a:extLst>
           </p:cNvPr>
@@ -7252,13 +7342,13 @@
           <p:nvPr/>
         </p:nvCxnSpPr>
         <p:spPr>
-          <a:xfrm flipH="1">
-            <a:off x="12386082" y="4966782"/>
-            <a:ext cx="72953" cy="132809"/>
+          <a:xfrm rot="10800000" flipV="1">
+            <a:off x="12338777" y="5029451"/>
+            <a:ext cx="127009" cy="108247"/>
           </a:xfrm>
           <a:prstGeom prst="curvedConnector3">
             <a:avLst>
-              <a:gd name="adj1" fmla="val -313352"/>
+              <a:gd name="adj1" fmla="val -216834"/>
             </a:avLst>
           </a:prstGeom>
           <a:ln>
@@ -7284,61 +7374,6 @@
           </a:fontRef>
         </p:style>
       </p:cxnSp>
-      <p:sp>
-        <p:nvSpPr>
-          <p:cNvPr id="61" name="TextBox 60">
-            <a:extLst>
-              <a:ext uri="{FF2B5EF4-FFF2-40B4-BE49-F238E27FC236}">
-                <a16:creationId xmlns:a16="http://schemas.microsoft.com/office/drawing/2014/main" id="{A6AA3A69-FF3B-4544-9DE5-D79C590BA53D}"/>
-              </a:ext>
-            </a:extLst>
-          </p:cNvPr>
-          <p:cNvSpPr txBox="1"/>
-          <p:nvPr/>
-        </p:nvSpPr>
-        <p:spPr>
-          <a:xfrm>
-            <a:off x="294013" y="6533668"/>
-            <a:ext cx="9254858" cy="220916"/>
-          </a:xfrm>
-          <a:prstGeom prst="rect">
-            <a:avLst/>
-          </a:prstGeom>
-          <a:noFill/>
-        </p:spPr>
-        <p:txBody>
-          <a:bodyPr wrap="square" lIns="0" tIns="0" rIns="0" bIns="0" rtlCol="0">
-            <a:spAutoFit/>
-          </a:bodyPr>
-          <a:lstStyle/>
-          <a:p>
-            <a:r>
-              <a:rPr lang="en-US" sz="1400" dirty="0">
-                <a:solidFill>
-                  <a:srgbClr val="0070C0"/>
-                </a:solidFill>
-              </a:rPr>
-              <a:t>&lt;</a:t>
-            </a:r>
-            <a:r>
-              <a:rPr lang="en-US" sz="1400" dirty="0" err="1">
-                <a:solidFill>
-                  <a:srgbClr val="0070C0"/>
-                </a:solidFill>
-              </a:rPr>
-              <a:t>args</a:t>
-            </a:r>
-            <a:r>
-              <a:rPr lang="en-US" sz="1400" dirty="0">
-                <a:solidFill>
-                  <a:srgbClr val="0070C0"/>
-                </a:solidFill>
-              </a:rPr>
-              <a:t>&gt; = n/destroyer c/a1 r/vertical t/tag</a:t>
-            </a:r>
-          </a:p>
-        </p:txBody>
-      </p:sp>
     </p:spTree>
     <p:extLst>
       <p:ext uri="{BB962C8B-B14F-4D97-AF65-F5344CB8AC3E}">

</xml_diff>

<commit_message>
Update image file for sequence diagram of PutShip
</commit_message>
<xml_diff>
--- a/docs/diagrams/PutShipSequenceDiagram.pptx
+++ b/docs/diagrams/PutShipSequenceDiagram.pptx
@@ -129,7 +129,7 @@
 <file path=ppt/revisionInfo.xml><?xml version="1.0" encoding="utf-8"?>
 <p1510:revInfo xmlns:a="http://schemas.openxmlformats.org/drawingml/2006/main" xmlns:r="http://schemas.openxmlformats.org/officeDocument/2006/relationships" xmlns:p1510="http://schemas.microsoft.com/office/powerpoint/2015/10/main">
   <p1510:revLst>
-    <p1510:client id="{E7B3513D-77CA-6A41-910B-0B9402F691A1}" v="1" dt="2019-04-05T01:25:36.917"/>
+    <p1510:client id="{E7B3513D-77CA-6A41-910B-0B9402F691A1}" v="2" dt="2019-04-05T01:26:08.823"/>
   </p1510:revLst>
 </p1510:revInfo>
 </file>
@@ -980,16 +980,24 @@
   <pc:docChgLst>
     <pc:chgData name="Ian Wu Ling En" userId="28715549-2f5c-46f8-b7f8-f39c35f3312d" providerId="ADAL" clId="{E7B3513D-77CA-6A41-910B-0B9402F691A1}"/>
     <pc:docChg chg="undo custSel modSld">
-      <pc:chgData name="Ian Wu Ling En" userId="28715549-2f5c-46f8-b7f8-f39c35f3312d" providerId="ADAL" clId="{E7B3513D-77CA-6A41-910B-0B9402F691A1}" dt="2019-04-05T01:25:44.900" v="38" actId="1076"/>
+      <pc:chgData name="Ian Wu Ling En" userId="28715549-2f5c-46f8-b7f8-f39c35f3312d" providerId="ADAL" clId="{E7B3513D-77CA-6A41-910B-0B9402F691A1}" dt="2019-04-05T01:26:24.754" v="40" actId="478"/>
       <pc:docMkLst>
         <pc:docMk/>
       </pc:docMkLst>
       <pc:sldChg chg="addSp delSp modSp">
-        <pc:chgData name="Ian Wu Ling En" userId="28715549-2f5c-46f8-b7f8-f39c35f3312d" providerId="ADAL" clId="{E7B3513D-77CA-6A41-910B-0B9402F691A1}" dt="2019-04-05T01:25:44.900" v="38" actId="1076"/>
+        <pc:chgData name="Ian Wu Ling En" userId="28715549-2f5c-46f8-b7f8-f39c35f3312d" providerId="ADAL" clId="{E7B3513D-77CA-6A41-910B-0B9402F691A1}" dt="2019-04-05T01:26:24.754" v="40" actId="478"/>
         <pc:sldMkLst>
           <pc:docMk/>
           <pc:sldMk cId="3945898909" sldId="267"/>
         </pc:sldMkLst>
+        <pc:spChg chg="add del mod">
+          <ac:chgData name="Ian Wu Ling En" userId="28715549-2f5c-46f8-b7f8-f39c35f3312d" providerId="ADAL" clId="{E7B3513D-77CA-6A41-910B-0B9402F691A1}" dt="2019-04-05T01:26:24.754" v="40" actId="478"/>
+          <ac:spMkLst>
+            <pc:docMk/>
+            <pc:sldMk cId="3945898909" sldId="267"/>
+            <ac:spMk id="48" creationId="{605601C2-3D38-4149-9622-6185CFC62D0B}"/>
+          </ac:spMkLst>
+        </pc:spChg>
         <pc:cxnChg chg="mod">
           <ac:chgData name="Ian Wu Ling En" userId="28715549-2f5c-46f8-b7f8-f39c35f3312d" providerId="ADAL" clId="{E7B3513D-77CA-6A41-910B-0B9402F691A1}" dt="2019-04-05T01:25:05.747" v="23" actId="14100"/>
           <ac:cxnSpMkLst>

</xml_diff>

<commit_message>
Update PutShipCommand sequence diagram Update putShip() command call in sequence diagram.
</commit_message>
<xml_diff>
--- a/docs/diagrams/PutShipSequenceDiagram.pptx
+++ b/docs/diagrams/PutShipSequenceDiagram.pptx
@@ -129,7 +129,7 @@
 <file path=ppt/revisionInfo.xml><?xml version="1.0" encoding="utf-8"?>
 <p1510:revInfo xmlns:a="http://schemas.openxmlformats.org/drawingml/2006/main" xmlns:r="http://schemas.openxmlformats.org/officeDocument/2006/relationships" xmlns:p1510="http://schemas.microsoft.com/office/powerpoint/2015/10/main">
   <p1510:revLst>
-    <p1510:client id="{E7B3513D-77CA-6A41-910B-0B9402F691A1}" v="63" dt="2019-04-10T12:22:01.953"/>
+    <p1510:client id="{E7B3513D-77CA-6A41-910B-0B9402F691A1}" v="66" dt="2019-04-12T13:47:04.176"/>
   </p1510:revLst>
 </p1510:revInfo>
 </file>
@@ -980,12 +980,12 @@
   <pc:docChgLst>
     <pc:chgData name="Ian Wu Ling En" userId="28715549-2f5c-46f8-b7f8-f39c35f3312d" providerId="ADAL" clId="{E7B3513D-77CA-6A41-910B-0B9402F691A1}"/>
     <pc:docChg chg="undo redo custSel modSld modMainMaster">
-      <pc:chgData name="Ian Wu Ling En" userId="28715549-2f5c-46f8-b7f8-f39c35f3312d" providerId="ADAL" clId="{E7B3513D-77CA-6A41-910B-0B9402F691A1}" dt="2019-04-10T12:22:38.415" v="732" actId="20577"/>
+      <pc:chgData name="Ian Wu Ling En" userId="28715549-2f5c-46f8-b7f8-f39c35f3312d" providerId="ADAL" clId="{E7B3513D-77CA-6A41-910B-0B9402F691A1}" dt="2019-04-12T13:47:53.764" v="746" actId="1076"/>
       <pc:docMkLst>
         <pc:docMk/>
       </pc:docMkLst>
       <pc:sldChg chg="addSp delSp modSp">
-        <pc:chgData name="Ian Wu Ling En" userId="28715549-2f5c-46f8-b7f8-f39c35f3312d" providerId="ADAL" clId="{E7B3513D-77CA-6A41-910B-0B9402F691A1}" dt="2019-04-10T12:22:38.415" v="732" actId="20577"/>
+        <pc:chgData name="Ian Wu Ling En" userId="28715549-2f5c-46f8-b7f8-f39c35f3312d" providerId="ADAL" clId="{E7B3513D-77CA-6A41-910B-0B9402F691A1}" dt="2019-04-12T13:47:53.764" v="746" actId="1076"/>
         <pc:sldMkLst>
           <pc:docMk/>
           <pc:sldMk cId="3945898909" sldId="267"/>
@@ -1087,15 +1087,15 @@
           </ac:spMkLst>
         </pc:spChg>
         <pc:spChg chg="mod">
-          <ac:chgData name="Ian Wu Ling En" userId="28715549-2f5c-46f8-b7f8-f39c35f3312d" providerId="ADAL" clId="{E7B3513D-77CA-6A41-910B-0B9402F691A1}" dt="2019-04-10T12:15:25.325" v="705" actId="1076"/>
+          <ac:chgData name="Ian Wu Ling En" userId="28715549-2f5c-46f8-b7f8-f39c35f3312d" providerId="ADAL" clId="{E7B3513D-77CA-6A41-910B-0B9402F691A1}" dt="2019-04-12T13:47:53.764" v="746" actId="1076"/>
           <ac:spMkLst>
             <pc:docMk/>
             <pc:sldMk cId="3945898909" sldId="267"/>
             <ac:spMk id="61" creationId="{A6AA3A69-FF3B-4544-9DE5-D79C590BA53D}"/>
           </ac:spMkLst>
         </pc:spChg>
-        <pc:spChg chg="mod">
-          <ac:chgData name="Ian Wu Ling En" userId="28715549-2f5c-46f8-b7f8-f39c35f3312d" providerId="ADAL" clId="{E7B3513D-77CA-6A41-910B-0B9402F691A1}" dt="2019-04-10T12:11:00.961" v="647" actId="14100"/>
+        <pc:spChg chg="del mod topLvl">
+          <ac:chgData name="Ian Wu Ling En" userId="28715549-2f5c-46f8-b7f8-f39c35f3312d" providerId="ADAL" clId="{E7B3513D-77CA-6A41-910B-0B9402F691A1}" dt="2019-04-12T13:47:10.680" v="738" actId="478"/>
           <ac:spMkLst>
             <pc:docMk/>
             <pc:sldMk cId="3945898909" sldId="267"/>
@@ -1110,8 +1110,8 @@
             <ac:spMk id="65" creationId="{00000000-0000-0000-0000-000000000000}"/>
           </ac:spMkLst>
         </pc:spChg>
-        <pc:spChg chg="mod">
-          <ac:chgData name="Ian Wu Ling En" userId="28715549-2f5c-46f8-b7f8-f39c35f3312d" providerId="ADAL" clId="{E7B3513D-77CA-6A41-910B-0B9402F691A1}" dt="2019-04-10T12:07:05.665" v="612" actId="164"/>
+        <pc:spChg chg="mod topLvl">
+          <ac:chgData name="Ian Wu Ling En" userId="28715549-2f5c-46f8-b7f8-f39c35f3312d" providerId="ADAL" clId="{E7B3513D-77CA-6A41-910B-0B9402F691A1}" dt="2019-04-12T13:47:08.608" v="736" actId="1076"/>
           <ac:spMkLst>
             <pc:docMk/>
             <pc:sldMk cId="3945898909" sldId="267"/>
@@ -1191,6 +1191,14 @@
           </ac:spMkLst>
         </pc:spChg>
         <pc:spChg chg="add mod">
+          <ac:chgData name="Ian Wu Ling En" userId="28715549-2f5c-46f8-b7f8-f39c35f3312d" providerId="ADAL" clId="{E7B3513D-77CA-6A41-910B-0B9402F691A1}" dt="2019-04-12T13:46:58.872" v="734" actId="571"/>
+          <ac:spMkLst>
+            <pc:docMk/>
+            <pc:sldMk cId="3945898909" sldId="267"/>
+            <ac:spMk id="95" creationId="{01BDAA4D-0C2E-BE47-B795-5DF296B37B00}"/>
+          </ac:spMkLst>
+        </pc:spChg>
+        <pc:spChg chg="add mod">
           <ac:chgData name="Ian Wu Ling En" userId="28715549-2f5c-46f8-b7f8-f39c35f3312d" providerId="ADAL" clId="{E7B3513D-77CA-6A41-910B-0B9402F691A1}" dt="2019-04-10T12:17:52.801" v="710" actId="20577"/>
           <ac:spMkLst>
             <pc:docMk/>
@@ -1391,7 +1399,7 @@
           </ac:spMkLst>
         </pc:spChg>
         <pc:spChg chg="add mod">
-          <ac:chgData name="Ian Wu Ling En" userId="28715549-2f5c-46f8-b7f8-f39c35f3312d" providerId="ADAL" clId="{E7B3513D-77CA-6A41-910B-0B9402F691A1}" dt="2019-04-10T12:14:41.409" v="703" actId="14100"/>
+          <ac:chgData name="Ian Wu Ling En" userId="28715549-2f5c-46f8-b7f8-f39c35f3312d" providerId="ADAL" clId="{E7B3513D-77CA-6A41-910B-0B9402F691A1}" dt="2019-04-12T13:47:34.480" v="741" actId="14100"/>
           <ac:spMkLst>
             <pc:docMk/>
             <pc:sldMk cId="3945898909" sldId="267"/>
@@ -1399,7 +1407,7 @@
           </ac:spMkLst>
         </pc:spChg>
         <pc:spChg chg="add mod">
-          <ac:chgData name="Ian Wu Ling En" userId="28715549-2f5c-46f8-b7f8-f39c35f3312d" providerId="ADAL" clId="{E7B3513D-77CA-6A41-910B-0B9402F691A1}" dt="2019-04-10T12:14:38.118" v="702" actId="14100"/>
+          <ac:chgData name="Ian Wu Ling En" userId="28715549-2f5c-46f8-b7f8-f39c35f3312d" providerId="ADAL" clId="{E7B3513D-77CA-6A41-910B-0B9402F691A1}" dt="2019-04-12T13:47:34.480" v="741" actId="14100"/>
           <ac:spMkLst>
             <pc:docMk/>
             <pc:sldMk cId="3945898909" sldId="267"/>
@@ -1414,8 +1422,8 @@
             <ac:spMk id="186" creationId="{ED894C81-4B95-4AAC-AEB1-37FB58E82CB3}"/>
           </ac:spMkLst>
         </pc:spChg>
-        <pc:spChg chg="mod">
-          <ac:chgData name="Ian Wu Ling En" userId="28715549-2f5c-46f8-b7f8-f39c35f3312d" providerId="ADAL" clId="{E7B3513D-77CA-6A41-910B-0B9402F691A1}" dt="2019-04-10T12:22:20.263" v="730" actId="14100"/>
+        <pc:spChg chg="mod topLvl">
+          <ac:chgData name="Ian Wu Ling En" userId="28715549-2f5c-46f8-b7f8-f39c35f3312d" providerId="ADAL" clId="{E7B3513D-77CA-6A41-910B-0B9402F691A1}" dt="2019-04-12T13:47:04.176" v="735" actId="165"/>
           <ac:spMkLst>
             <pc:docMk/>
             <pc:sldMk cId="3945898909" sldId="267"/>
@@ -1454,8 +1462,8 @@
             <ac:grpSpMk id="106" creationId="{912908E9-BED1-5246-B69F-ECC819CB3435}"/>
           </ac:grpSpMkLst>
         </pc:grpChg>
-        <pc:grpChg chg="add mod">
-          <ac:chgData name="Ian Wu Ling En" userId="28715549-2f5c-46f8-b7f8-f39c35f3312d" providerId="ADAL" clId="{E7B3513D-77CA-6A41-910B-0B9402F691A1}" dt="2019-04-10T12:07:34.180" v="620" actId="1076"/>
+        <pc:grpChg chg="add del mod">
+          <ac:chgData name="Ian Wu Ling En" userId="28715549-2f5c-46f8-b7f8-f39c35f3312d" providerId="ADAL" clId="{E7B3513D-77CA-6A41-910B-0B9402F691A1}" dt="2019-04-12T13:47:04.176" v="735" actId="165"/>
           <ac:grpSpMkLst>
             <pc:docMk/>
             <pc:sldMk cId="3945898909" sldId="267"/>
@@ -1559,7 +1567,7 @@
           </ac:cxnSpMkLst>
         </pc:cxnChg>
         <pc:cxnChg chg="mod">
-          <ac:chgData name="Ian Wu Ling En" userId="28715549-2f5c-46f8-b7f8-f39c35f3312d" providerId="ADAL" clId="{E7B3513D-77CA-6A41-910B-0B9402F691A1}" dt="2019-04-10T12:13:45.435" v="689" actId="14100"/>
+          <ac:chgData name="Ian Wu Ling En" userId="28715549-2f5c-46f8-b7f8-f39c35f3312d" providerId="ADAL" clId="{E7B3513D-77CA-6A41-910B-0B9402F691A1}" dt="2019-04-12T13:47:38.032" v="742" actId="14100"/>
           <ac:cxnSpMkLst>
             <pc:docMk/>
             <pc:sldMk cId="3945898909" sldId="267"/>
@@ -1606,8 +1614,8 @@
             <ac:cxnSpMk id="70" creationId="{51A78A03-963D-41D5-A96D-D610AC186B7D}"/>
           </ac:cxnSpMkLst>
         </pc:cxnChg>
-        <pc:cxnChg chg="mod">
-          <ac:chgData name="Ian Wu Ling En" userId="28715549-2f5c-46f8-b7f8-f39c35f3312d" providerId="ADAL" clId="{E7B3513D-77CA-6A41-910B-0B9402F691A1}" dt="2019-04-10T12:07:05.665" v="612" actId="164"/>
+        <pc:cxnChg chg="del mod topLvl">
+          <ac:chgData name="Ian Wu Ling En" userId="28715549-2f5c-46f8-b7f8-f39c35f3312d" providerId="ADAL" clId="{E7B3513D-77CA-6A41-910B-0B9402F691A1}" dt="2019-04-12T13:47:10.026" v="737" actId="478"/>
           <ac:cxnSpMkLst>
             <pc:docMk/>
             <pc:sldMk cId="3945898909" sldId="267"/>
@@ -1654,8 +1662,8 @@
             <ac:cxnSpMk id="87" creationId="{25C585B1-9B63-40DC-A033-F1940D483812}"/>
           </ac:cxnSpMkLst>
         </pc:cxnChg>
-        <pc:cxnChg chg="add mod">
-          <ac:chgData name="Ian Wu Ling En" userId="28715549-2f5c-46f8-b7f8-f39c35f3312d" providerId="ADAL" clId="{E7B3513D-77CA-6A41-910B-0B9402F691A1}" dt="2019-04-10T12:07:05.665" v="612" actId="164"/>
+        <pc:cxnChg chg="add del mod topLvl">
+          <ac:chgData name="Ian Wu Ling En" userId="28715549-2f5c-46f8-b7f8-f39c35f3312d" providerId="ADAL" clId="{E7B3513D-77CA-6A41-910B-0B9402F691A1}" dt="2019-04-12T13:47:11.447" v="739" actId="478"/>
           <ac:cxnSpMkLst>
             <pc:docMk/>
             <pc:sldMk cId="3945898909" sldId="267"/>
@@ -1703,7 +1711,7 @@
           </ac:cxnSpMkLst>
         </pc:cxnChg>
         <pc:cxnChg chg="add mod">
-          <ac:chgData name="Ian Wu Ling En" userId="28715549-2f5c-46f8-b7f8-f39c35f3312d" providerId="ADAL" clId="{E7B3513D-77CA-6A41-910B-0B9402F691A1}" dt="2019-04-10T12:13:48.585" v="690" actId="14100"/>
+          <ac:chgData name="Ian Wu Ling En" userId="28715549-2f5c-46f8-b7f8-f39c35f3312d" providerId="ADAL" clId="{E7B3513D-77CA-6A41-910B-0B9402F691A1}" dt="2019-04-12T13:47:41.270" v="743" actId="14100"/>
           <ac:cxnSpMkLst>
             <pc:docMk/>
             <pc:sldMk cId="3945898909" sldId="267"/>
@@ -1751,7 +1759,7 @@
           </ac:cxnSpMkLst>
         </pc:cxnChg>
         <pc:cxnChg chg="add mod">
-          <ac:chgData name="Ian Wu Ling En" userId="28715549-2f5c-46f8-b7f8-f39c35f3312d" providerId="ADAL" clId="{E7B3513D-77CA-6A41-910B-0B9402F691A1}" dt="2019-04-10T12:21:19.083" v="723" actId="14100"/>
+          <ac:chgData name="Ian Wu Ling En" userId="28715549-2f5c-46f8-b7f8-f39c35f3312d" providerId="ADAL" clId="{E7B3513D-77CA-6A41-910B-0B9402F691A1}" dt="2019-04-12T13:47:44.527" v="744" actId="14100"/>
           <ac:cxnSpMkLst>
             <pc:docMk/>
             <pc:sldMk cId="3945898909" sldId="267"/>
@@ -1839,7 +1847,7 @@
           </ac:cxnSpMkLst>
         </pc:cxnChg>
         <pc:cxnChg chg="mod">
-          <ac:chgData name="Ian Wu Ling En" userId="28715549-2f5c-46f8-b7f8-f39c35f3312d" providerId="ADAL" clId="{E7B3513D-77CA-6A41-910B-0B9402F691A1}" dt="2019-04-10T12:13:53.851" v="692" actId="14100"/>
+          <ac:chgData name="Ian Wu Ling En" userId="28715549-2f5c-46f8-b7f8-f39c35f3312d" providerId="ADAL" clId="{E7B3513D-77CA-6A41-910B-0B9402F691A1}" dt="2019-04-12T13:47:48.472" v="745" actId="14100"/>
           <ac:cxnSpMkLst>
             <pc:docMk/>
             <pc:sldMk cId="3945898909" sldId="267"/>
@@ -2239,7 +2247,7 @@
           <a:p>
             <a:fld id="{F5CC4B3F-88C1-4FFA-B1B6-F41C21DC6924}" type="datetimeFigureOut">
               <a:rPr lang="en-US" smtClean="0"/>
-              <a:t>4/10/19</a:t>
+              <a:t>4/12/19</a:t>
             </a:fld>
             <a:endParaRPr lang="en-US"/>
           </a:p>
@@ -2774,7 +2782,7 @@
           <a:p>
             <a:fld id="{78C97017-6FC3-485B-9764-EAC9E56C1D49}" type="datetimeFigureOut">
               <a:rPr lang="en-US" smtClean="0"/>
-              <a:t>4/10/19</a:t>
+              <a:t>4/12/19</a:t>
             </a:fld>
             <a:endParaRPr lang="en-US"/>
           </a:p>
@@ -2942,7 +2950,7 @@
           <a:p>
             <a:fld id="{78C97017-6FC3-485B-9764-EAC9E56C1D49}" type="datetimeFigureOut">
               <a:rPr lang="en-US" smtClean="0"/>
-              <a:t>4/10/19</a:t>
+              <a:t>4/12/19</a:t>
             </a:fld>
             <a:endParaRPr lang="en-US"/>
           </a:p>
@@ -3120,7 +3128,7 @@
           <a:p>
             <a:fld id="{78C97017-6FC3-485B-9764-EAC9E56C1D49}" type="datetimeFigureOut">
               <a:rPr lang="en-US" smtClean="0"/>
-              <a:t>4/10/19</a:t>
+              <a:t>4/12/19</a:t>
             </a:fld>
             <a:endParaRPr lang="en-US"/>
           </a:p>
@@ -3288,7 +3296,7 @@
           <a:p>
             <a:fld id="{78C97017-6FC3-485B-9764-EAC9E56C1D49}" type="datetimeFigureOut">
               <a:rPr lang="en-US" smtClean="0"/>
-              <a:t>4/10/19</a:t>
+              <a:t>4/12/19</a:t>
             </a:fld>
             <a:endParaRPr lang="en-US"/>
           </a:p>
@@ -3533,7 +3541,7 @@
           <a:p>
             <a:fld id="{78C97017-6FC3-485B-9764-EAC9E56C1D49}" type="datetimeFigureOut">
               <a:rPr lang="en-US" smtClean="0"/>
-              <a:t>4/10/19</a:t>
+              <a:t>4/12/19</a:t>
             </a:fld>
             <a:endParaRPr lang="en-US"/>
           </a:p>
@@ -3818,7 +3826,7 @@
           <a:p>
             <a:fld id="{78C97017-6FC3-485B-9764-EAC9E56C1D49}" type="datetimeFigureOut">
               <a:rPr lang="en-US" smtClean="0"/>
-              <a:t>4/10/19</a:t>
+              <a:t>4/12/19</a:t>
             </a:fld>
             <a:endParaRPr lang="en-US"/>
           </a:p>
@@ -4237,7 +4245,7 @@
           <a:p>
             <a:fld id="{78C97017-6FC3-485B-9764-EAC9E56C1D49}" type="datetimeFigureOut">
               <a:rPr lang="en-US" smtClean="0"/>
-              <a:t>4/10/19</a:t>
+              <a:t>4/12/19</a:t>
             </a:fld>
             <a:endParaRPr lang="en-US"/>
           </a:p>
@@ -4354,7 +4362,7 @@
           <a:p>
             <a:fld id="{78C97017-6FC3-485B-9764-EAC9E56C1D49}" type="datetimeFigureOut">
               <a:rPr lang="en-US" smtClean="0"/>
-              <a:t>4/10/19</a:t>
+              <a:t>4/12/19</a:t>
             </a:fld>
             <a:endParaRPr lang="en-US"/>
           </a:p>
@@ -4449,7 +4457,7 @@
           <a:p>
             <a:fld id="{78C97017-6FC3-485B-9764-EAC9E56C1D49}" type="datetimeFigureOut">
               <a:rPr lang="en-US" smtClean="0"/>
-              <a:t>4/10/19</a:t>
+              <a:t>4/12/19</a:t>
             </a:fld>
             <a:endParaRPr lang="en-US"/>
           </a:p>
@@ -4724,7 +4732,7 @@
           <a:p>
             <a:fld id="{78C97017-6FC3-485B-9764-EAC9E56C1D49}" type="datetimeFigureOut">
               <a:rPr lang="en-US" smtClean="0"/>
-              <a:t>4/10/19</a:t>
+              <a:t>4/12/19</a:t>
             </a:fld>
             <a:endParaRPr lang="en-US"/>
           </a:p>
@@ -4976,7 +4984,7 @@
           <a:p>
             <a:fld id="{78C97017-6FC3-485B-9764-EAC9E56C1D49}" type="datetimeFigureOut">
               <a:rPr lang="en-US" smtClean="0"/>
-              <a:t>4/10/19</a:t>
+              <a:t>4/12/19</a:t>
             </a:fld>
             <a:endParaRPr lang="en-US"/>
           </a:p>
@@ -5187,7 +5195,7 @@
           <a:p>
             <a:fld id="{78C97017-6FC3-485B-9764-EAC9E56C1D49}" type="datetimeFigureOut">
               <a:rPr lang="en-US" smtClean="0"/>
-              <a:t>4/10/19</a:t>
+              <a:t>4/12/19</a:t>
             </a:fld>
             <a:endParaRPr lang="en-US"/>
           </a:p>
@@ -5576,8 +5584,8 @@
         </p:nvSpPr>
         <p:spPr>
           <a:xfrm>
-            <a:off x="9699812" y="283029"/>
-            <a:ext cx="7075272" cy="11473542"/>
+            <a:off x="9699812" y="296676"/>
+            <a:ext cx="7075272" cy="10908136"/>
           </a:xfrm>
           <a:prstGeom prst="roundRect">
             <a:avLst>
@@ -5644,7 +5652,7 @@
         <p:spPr>
           <a:xfrm>
             <a:off x="243124" y="261257"/>
-            <a:ext cx="9336305" cy="11473543"/>
+            <a:ext cx="9336305" cy="10908137"/>
           </a:xfrm>
           <a:prstGeom prst="roundRect">
             <a:avLst>
@@ -6482,7 +6490,7 @@
         <p:spPr>
           <a:xfrm>
             <a:off x="10689736" y="3177915"/>
-            <a:ext cx="0" cy="7512252"/>
+            <a:ext cx="0" cy="7985954"/>
           </a:xfrm>
           <a:prstGeom prst="line">
             <a:avLst/>
@@ -7444,7 +7452,7 @@
         <p:spPr>
           <a:xfrm>
             <a:off x="15148010" y="5120410"/>
-            <a:ext cx="0" cy="5586383"/>
+            <a:ext cx="0" cy="6043459"/>
           </a:xfrm>
           <a:prstGeom prst="line">
             <a:avLst/>
@@ -7929,7 +7937,7 @@
         </p:nvSpPr>
         <p:spPr>
           <a:xfrm>
-            <a:off x="350104" y="11948725"/>
+            <a:off x="350104" y="11361872"/>
             <a:ext cx="9254858" cy="430887"/>
           </a:xfrm>
           <a:prstGeom prst="rect">
@@ -8001,288 +8009,119 @@
           </a:p>
         </p:txBody>
       </p:sp>
-      <p:grpSp>
-        <p:nvGrpSpPr>
-          <p:cNvPr id="135" name="Group 134">
+      <p:sp>
+        <p:nvSpPr>
+          <p:cNvPr id="187" name="Rectangle 186">
             <a:extLst>
               <a:ext uri="{FF2B5EF4-FFF2-40B4-BE49-F238E27FC236}">
-                <a16:creationId xmlns:a16="http://schemas.microsoft.com/office/drawing/2014/main" id="{1AECB110-556A-A947-93C9-A44F191844AC}"/>
+                <a16:creationId xmlns:a16="http://schemas.microsoft.com/office/drawing/2014/main" id="{09B0E711-DA47-4651-8AB4-F1BD8D990B22}"/>
               </a:ext>
             </a:extLst>
           </p:cNvPr>
-          <p:cNvGrpSpPr/>
+          <p:cNvSpPr/>
           <p:nvPr/>
-        </p:nvGrpSpPr>
-        <p:grpSpPr>
+        </p:nvSpPr>
+        <p:spPr>
           <a:xfrm>
-            <a:off x="15062479" y="6908592"/>
-            <a:ext cx="1942503" cy="636744"/>
-            <a:chOff x="15062479" y="6320116"/>
-            <a:chExt cx="1942503" cy="636744"/>
+            <a:off x="15062479" y="7063992"/>
+            <a:ext cx="145369" cy="481344"/>
           </a:xfrm>
-        </p:grpSpPr>
-        <p:sp>
-          <p:nvSpPr>
-            <p:cNvPr id="187" name="Rectangle 186">
-              <a:extLst>
-                <a:ext uri="{FF2B5EF4-FFF2-40B4-BE49-F238E27FC236}">
-                  <a16:creationId xmlns:a16="http://schemas.microsoft.com/office/drawing/2014/main" id="{09B0E711-DA47-4651-8AB4-F1BD8D990B22}"/>
-                </a:ext>
-              </a:extLst>
-            </p:cNvPr>
-            <p:cNvSpPr/>
-            <p:nvPr/>
-          </p:nvSpPr>
-          <p:spPr>
-            <a:xfrm>
-              <a:off x="15062479" y="6475516"/>
-              <a:ext cx="145369" cy="481344"/>
-            </a:xfrm>
-            <a:prstGeom prst="rect">
-              <a:avLst/>
-            </a:prstGeom>
-            <a:solidFill>
-              <a:srgbClr val="FF669A"/>
-            </a:solidFill>
-            <a:ln>
-              <a:noFill/>
-            </a:ln>
-            <a:effectLst/>
-          </p:spPr>
-          <p:style>
-            <a:lnRef idx="1">
-              <a:schemeClr val="accent3"/>
-            </a:lnRef>
-            <a:fillRef idx="2">
-              <a:schemeClr val="accent3"/>
-            </a:fillRef>
-            <a:effectRef idx="1">
-              <a:schemeClr val="accent3"/>
-            </a:effectRef>
-            <a:fontRef idx="minor">
-              <a:schemeClr val="dk1"/>
-            </a:fontRef>
-          </p:style>
-          <p:txBody>
-            <a:bodyPr rtlCol="0" anchor="ctr"/>
-            <a:lstStyle/>
-            <a:p>
-              <a:pPr algn="ctr"/>
-              <a:endParaRPr lang="en-SG" sz="1400"/>
-            </a:p>
-          </p:txBody>
-        </p:sp>
-        <p:sp>
-          <p:nvSpPr>
-            <p:cNvPr id="64" name="Rectangle 63">
-              <a:extLst>
-                <a:ext uri="{FF2B5EF4-FFF2-40B4-BE49-F238E27FC236}">
-                  <a16:creationId xmlns:a16="http://schemas.microsoft.com/office/drawing/2014/main" id="{8FD74532-ECA6-FD4B-B1AA-7BDC9A36980E}"/>
-                </a:ext>
-              </a:extLst>
-            </p:cNvPr>
-            <p:cNvSpPr/>
-            <p:nvPr/>
-          </p:nvSpPr>
-          <p:spPr>
-            <a:xfrm>
-              <a:off x="15207864" y="6616555"/>
-              <a:ext cx="138373" cy="223074"/>
-            </a:xfrm>
-            <a:prstGeom prst="rect">
-              <a:avLst/>
-            </a:prstGeom>
-            <a:solidFill>
-              <a:srgbClr val="FF669A"/>
-            </a:solidFill>
-            <a:ln>
-              <a:noFill/>
-            </a:ln>
-            <a:effectLst/>
-          </p:spPr>
-          <p:style>
-            <a:lnRef idx="1">
-              <a:schemeClr val="accent3"/>
-            </a:lnRef>
-            <a:fillRef idx="2">
-              <a:schemeClr val="accent3"/>
-            </a:fillRef>
-            <a:effectRef idx="1">
-              <a:schemeClr val="accent3"/>
-            </a:effectRef>
-            <a:fontRef idx="minor">
-              <a:schemeClr val="dk1"/>
-            </a:fontRef>
-          </p:style>
-          <p:txBody>
-            <a:bodyPr rtlCol="0" anchor="ctr"/>
-            <a:lstStyle/>
-            <a:p>
-              <a:pPr algn="ctr"/>
-              <a:endParaRPr lang="en-SG" sz="1400">
+          <a:prstGeom prst="rect">
+            <a:avLst/>
+          </a:prstGeom>
+          <a:solidFill>
+            <a:srgbClr val="FF669A"/>
+          </a:solidFill>
+          <a:ln>
+            <a:noFill/>
+          </a:ln>
+          <a:effectLst/>
+        </p:spPr>
+        <p:style>
+          <a:lnRef idx="1">
+            <a:schemeClr val="accent3"/>
+          </a:lnRef>
+          <a:fillRef idx="2">
+            <a:schemeClr val="accent3"/>
+          </a:fillRef>
+          <a:effectRef idx="1">
+            <a:schemeClr val="accent3"/>
+          </a:effectRef>
+          <a:fontRef idx="minor">
+            <a:schemeClr val="dk1"/>
+          </a:fontRef>
+        </p:style>
+        <p:txBody>
+          <a:bodyPr rtlCol="0" anchor="ctr"/>
+          <a:lstStyle/>
+          <a:p>
+            <a:pPr algn="ctr"/>
+            <a:endParaRPr lang="en-SG" sz="1400"/>
+          </a:p>
+        </p:txBody>
+      </p:sp>
+      <p:sp>
+        <p:nvSpPr>
+          <p:cNvPr id="68" name="TextBox 67">
+            <a:extLst>
+              <a:ext uri="{FF2B5EF4-FFF2-40B4-BE49-F238E27FC236}">
+                <a16:creationId xmlns:a16="http://schemas.microsoft.com/office/drawing/2014/main" id="{30DD5FE9-12F7-3B4D-9DA7-5C75E842CE53}"/>
+              </a:ext>
+            </a:extLst>
+          </p:cNvPr>
+          <p:cNvSpPr txBox="1"/>
+          <p:nvPr/>
+        </p:nvSpPr>
+        <p:spPr>
+          <a:xfrm>
+            <a:off x="9185906" y="6872592"/>
+            <a:ext cx="1475876" cy="184666"/>
+          </a:xfrm>
+          <a:prstGeom prst="rect">
+            <a:avLst/>
+          </a:prstGeom>
+          <a:noFill/>
+          <a:ln>
+            <a:noFill/>
+          </a:ln>
+        </p:spPr>
+        <p:txBody>
+          <a:bodyPr wrap="square" lIns="0" tIns="0" rIns="0" bIns="0" rtlCol="0">
+            <a:spAutoFit/>
+          </a:bodyPr>
+          <a:lstStyle>
+            <a:defPPr>
+              <a:defRPr lang="en-US"/>
+            </a:defPPr>
+            <a:lvl1pPr algn="r">
+              <a:defRPr sz="1400">
+                <a:solidFill>
+                  <a:srgbClr val="0070C0"/>
+                </a:solidFill>
+              </a:defRPr>
+            </a:lvl1pPr>
+          </a:lstStyle>
+          <a:p>
+            <a:pPr algn="l"/>
+            <a:r>
+              <a:rPr lang="en-US" sz="1200" err="1">
                 <a:solidFill>
                   <a:srgbClr val="FF669A"/>
                 </a:solidFill>
-              </a:endParaRPr>
-            </a:p>
-          </p:txBody>
-        </p:sp>
-        <p:sp>
-          <p:nvSpPr>
-            <p:cNvPr id="68" name="TextBox 67">
-              <a:extLst>
-                <a:ext uri="{FF2B5EF4-FFF2-40B4-BE49-F238E27FC236}">
-                  <a16:creationId xmlns:a16="http://schemas.microsoft.com/office/drawing/2014/main" id="{30DD5FE9-12F7-3B4D-9DA7-5C75E842CE53}"/>
-                </a:ext>
-              </a:extLst>
-            </p:cNvPr>
-            <p:cNvSpPr txBox="1"/>
-            <p:nvPr/>
-          </p:nvSpPr>
-          <p:spPr>
-            <a:xfrm>
-              <a:off x="15529106" y="6320116"/>
-              <a:ext cx="1475876" cy="184666"/>
-            </a:xfrm>
-            <a:prstGeom prst="rect">
-              <a:avLst/>
-            </a:prstGeom>
-            <a:noFill/>
-            <a:ln>
-              <a:noFill/>
-            </a:ln>
-          </p:spPr>
-          <p:txBody>
-            <a:bodyPr wrap="square" lIns="0" tIns="0" rIns="0" bIns="0" rtlCol="0">
-              <a:spAutoFit/>
-            </a:bodyPr>
-            <a:lstStyle>
-              <a:defPPr>
-                <a:defRPr lang="en-US"/>
-              </a:defPPr>
-              <a:lvl1pPr algn="r">
-                <a:defRPr sz="1400">
-                  <a:solidFill>
-                    <a:srgbClr val="0070C0"/>
-                  </a:solidFill>
-                </a:defRPr>
-              </a:lvl1pPr>
-            </a:lstStyle>
-            <a:p>
-              <a:pPr algn="l"/>
-              <a:r>
-                <a:rPr lang="en-US" sz="1200" err="1">
-                  <a:solidFill>
-                    <a:srgbClr val="FF669A"/>
-                  </a:solidFill>
-                </a:rPr>
-                <a:t>putShip</a:t>
-              </a:r>
-              <a:r>
-                <a:rPr lang="en-US" sz="1200">
-                  <a:solidFill>
-                    <a:srgbClr val="FF669A"/>
-                  </a:solidFill>
-                </a:rPr>
-                <a:t>()</a:t>
-              </a:r>
-            </a:p>
-          </p:txBody>
-        </p:sp>
-        <p:cxnSp>
-          <p:nvCxnSpPr>
-            <p:cNvPr id="74" name="Curved Connector 73">
-              <a:extLst>
-                <a:ext uri="{FF2B5EF4-FFF2-40B4-BE49-F238E27FC236}">
-                  <a16:creationId xmlns:a16="http://schemas.microsoft.com/office/drawing/2014/main" id="{8EE03F7A-2058-6749-A748-E895D05F30BE}"/>
-                </a:ext>
-              </a:extLst>
-            </p:cNvPr>
-            <p:cNvCxnSpPr>
-              <a:cxnSpLocks/>
-            </p:cNvCxnSpPr>
-            <p:nvPr/>
-          </p:nvCxnSpPr>
-          <p:spPr>
-            <a:xfrm>
-              <a:off x="15167643" y="6533972"/>
-              <a:ext cx="167219" cy="83872"/>
-            </a:xfrm>
-            <a:prstGeom prst="curvedConnector3">
-              <a:avLst>
-                <a:gd name="adj1" fmla="val 293035"/>
-              </a:avLst>
-            </a:prstGeom>
-            <a:ln>
-              <a:solidFill>
-                <a:srgbClr val="FF669A"/>
-              </a:solidFill>
-              <a:tailEnd type="triangle"/>
-            </a:ln>
-          </p:spPr>
-          <p:style>
-            <a:lnRef idx="1">
-              <a:schemeClr val="accent1"/>
-            </a:lnRef>
-            <a:fillRef idx="0">
-              <a:schemeClr val="accent1"/>
-            </a:fillRef>
-            <a:effectRef idx="0">
-              <a:schemeClr val="accent1"/>
-            </a:effectRef>
-            <a:fontRef idx="minor">
-              <a:schemeClr val="tx1"/>
-            </a:fontRef>
-          </p:style>
-        </p:cxnSp>
-        <p:cxnSp>
-          <p:nvCxnSpPr>
-            <p:cNvPr id="88" name="Curved Connector 12">
-              <a:extLst>
-                <a:ext uri="{FF2B5EF4-FFF2-40B4-BE49-F238E27FC236}">
-                  <a16:creationId xmlns:a16="http://schemas.microsoft.com/office/drawing/2014/main" id="{92348BEA-70E7-7E48-83EB-D9A4C68B91F9}"/>
-                </a:ext>
-              </a:extLst>
-            </p:cNvPr>
-            <p:cNvCxnSpPr>
-              <a:cxnSpLocks/>
-            </p:cNvCxnSpPr>
-            <p:nvPr/>
-          </p:nvCxnSpPr>
-          <p:spPr>
-            <a:xfrm rot="10800000" flipV="1">
-              <a:off x="15200914" y="6830360"/>
-              <a:ext cx="127009" cy="108247"/>
-            </a:xfrm>
-            <a:prstGeom prst="curvedConnector3">
-              <a:avLst>
-                <a:gd name="adj1" fmla="val -216834"/>
-              </a:avLst>
-            </a:prstGeom>
-            <a:ln>
-              <a:solidFill>
-                <a:srgbClr val="FF669A"/>
-              </a:solidFill>
-              <a:prstDash val="sysDash"/>
-              <a:tailEnd type="triangle"/>
-            </a:ln>
-          </p:spPr>
-          <p:style>
-            <a:lnRef idx="1">
-              <a:schemeClr val="accent1"/>
-            </a:lnRef>
-            <a:fillRef idx="0">
-              <a:schemeClr val="accent1"/>
-            </a:fillRef>
-            <a:effectRef idx="0">
-              <a:schemeClr val="accent1"/>
-            </a:effectRef>
-            <a:fontRef idx="minor">
-              <a:schemeClr val="tx1"/>
-            </a:fontRef>
-          </p:style>
-        </p:cxnSp>
-      </p:grpSp>
+              </a:rPr>
+              <a:t>putShip</a:t>
+            </a:r>
+            <a:r>
+              <a:rPr lang="en-US" sz="1200">
+                <a:solidFill>
+                  <a:srgbClr val="FF669A"/>
+                </a:solidFill>
+              </a:rPr>
+              <a:t>()</a:t>
+            </a:r>
+          </a:p>
+        </p:txBody>
+      </p:sp>
       <p:cxnSp>
         <p:nvCxnSpPr>
           <p:cNvPr id="86" name="Curved Connector 85">
@@ -8834,7 +8673,7 @@
         <p:spPr>
           <a:xfrm>
             <a:off x="12245097" y="3396542"/>
-            <a:ext cx="0" cy="7293625"/>
+            <a:ext cx="0" cy="7780974"/>
           </a:xfrm>
           <a:prstGeom prst="line">
             <a:avLst/>
@@ -9151,7 +8990,7 @@
         <p:spPr>
           <a:xfrm>
             <a:off x="13677429" y="4315216"/>
-            <a:ext cx="0" cy="6374951"/>
+            <a:ext cx="0" cy="6848653"/>
           </a:xfrm>
           <a:prstGeom prst="line">
             <a:avLst/>

</xml_diff>

<commit_message>
Update PutShipCommand sequence diagram
</commit_message>
<xml_diff>
--- a/docs/diagrams/PutShipSequenceDiagram.pptx
+++ b/docs/diagrams/PutShipSequenceDiagram.pptx
@@ -129,7 +129,7 @@
 <file path=ppt/revisionInfo.xml><?xml version="1.0" encoding="utf-8"?>
 <p1510:revInfo xmlns:a="http://schemas.openxmlformats.org/drawingml/2006/main" xmlns:r="http://schemas.openxmlformats.org/officeDocument/2006/relationships" xmlns:p1510="http://schemas.microsoft.com/office/powerpoint/2015/10/main">
   <p1510:revLst>
-    <p1510:client id="{E7B3513D-77CA-6A41-910B-0B9402F691A1}" v="66" dt="2019-04-12T13:47:04.176"/>
+    <p1510:client id="{E7B3513D-77CA-6A41-910B-0B9402F691A1}" v="81" dt="2019-04-13T04:21:19.383"/>
   </p1510:revLst>
 </p1510:revInfo>
 </file>
@@ -980,12 +980,12 @@
   <pc:docChgLst>
     <pc:chgData name="Ian Wu Ling En" userId="28715549-2f5c-46f8-b7f8-f39c35f3312d" providerId="ADAL" clId="{E7B3513D-77CA-6A41-910B-0B9402F691A1}"/>
     <pc:docChg chg="undo redo custSel modSld modMainMaster">
-      <pc:chgData name="Ian Wu Ling En" userId="28715549-2f5c-46f8-b7f8-f39c35f3312d" providerId="ADAL" clId="{E7B3513D-77CA-6A41-910B-0B9402F691A1}" dt="2019-04-12T13:47:53.764" v="746" actId="1076"/>
+      <pc:chgData name="Ian Wu Ling En" userId="28715549-2f5c-46f8-b7f8-f39c35f3312d" providerId="ADAL" clId="{E7B3513D-77CA-6A41-910B-0B9402F691A1}" dt="2019-04-13T04:22:01.932" v="954" actId="20577"/>
       <pc:docMkLst>
         <pc:docMk/>
       </pc:docMkLst>
       <pc:sldChg chg="addSp delSp modSp">
-        <pc:chgData name="Ian Wu Ling En" userId="28715549-2f5c-46f8-b7f8-f39c35f3312d" providerId="ADAL" clId="{E7B3513D-77CA-6A41-910B-0B9402F691A1}" dt="2019-04-12T13:47:53.764" v="746" actId="1076"/>
+        <pc:chgData name="Ian Wu Ling En" userId="28715549-2f5c-46f8-b7f8-f39c35f3312d" providerId="ADAL" clId="{E7B3513D-77CA-6A41-910B-0B9402F691A1}" dt="2019-04-13T04:22:01.932" v="954" actId="20577"/>
         <pc:sldMkLst>
           <pc:docMk/>
           <pc:sldMk cId="3945898909" sldId="267"/>
@@ -998,16 +998,24 @@
             <ac:spMk id="2" creationId="{00000000-0000-0000-0000-000000000000}"/>
           </ac:spMkLst>
         </pc:spChg>
+        <pc:spChg chg="add del mod">
+          <ac:chgData name="Ian Wu Ling En" userId="28715549-2f5c-46f8-b7f8-f39c35f3312d" providerId="ADAL" clId="{E7B3513D-77CA-6A41-910B-0B9402F691A1}" dt="2019-04-13T03:48:02.982" v="845"/>
+          <ac:spMkLst>
+            <pc:docMk/>
+            <pc:sldMk cId="3945898909" sldId="267"/>
+            <ac:spMk id="3" creationId="{692D4AB6-A911-E548-9D18-63C086D90121}"/>
+          </ac:spMkLst>
+        </pc:spChg>
         <pc:spChg chg="mod">
-          <ac:chgData name="Ian Wu Ling En" userId="28715549-2f5c-46f8-b7f8-f39c35f3312d" providerId="ADAL" clId="{E7B3513D-77CA-6A41-910B-0B9402F691A1}" dt="2019-04-10T12:14:57.207" v="704" actId="14100"/>
+          <ac:chgData name="Ian Wu Ling En" userId="28715549-2f5c-46f8-b7f8-f39c35f3312d" providerId="ADAL" clId="{E7B3513D-77CA-6A41-910B-0B9402F691A1}" dt="2019-04-13T04:20:48.552" v="919" actId="14100"/>
           <ac:spMkLst>
             <pc:docMk/>
             <pc:sldMk cId="3945898909" sldId="267"/>
             <ac:spMk id="6" creationId="{00000000-0000-0000-0000-000000000000}"/>
           </ac:spMkLst>
         </pc:spChg>
-        <pc:spChg chg="mod">
-          <ac:chgData name="Ian Wu Ling En" userId="28715549-2f5c-46f8-b7f8-f39c35f3312d" providerId="ADAL" clId="{E7B3513D-77CA-6A41-910B-0B9402F691A1}" dt="2019-04-10T12:16:56.100" v="706" actId="790"/>
+        <pc:spChg chg="del mod">
+          <ac:chgData name="Ian Wu Ling En" userId="28715549-2f5c-46f8-b7f8-f39c35f3312d" providerId="ADAL" clId="{E7B3513D-77CA-6A41-910B-0B9402F691A1}" dt="2019-04-13T04:21:15.061" v="924" actId="478"/>
           <ac:spMkLst>
             <pc:docMk/>
             <pc:sldMk cId="3945898909" sldId="267"/>
@@ -1047,7 +1055,7 @@
           </ac:spMkLst>
         </pc:spChg>
         <pc:spChg chg="mod">
-          <ac:chgData name="Ian Wu Ling En" userId="28715549-2f5c-46f8-b7f8-f39c35f3312d" providerId="ADAL" clId="{E7B3513D-77CA-6A41-910B-0B9402F691A1}" dt="2019-04-10T11:48:40.160" v="344" actId="1076"/>
+          <ac:chgData name="Ian Wu Ling En" userId="28715549-2f5c-46f8-b7f8-f39c35f3312d" providerId="ADAL" clId="{E7B3513D-77CA-6A41-910B-0B9402F691A1}" dt="2019-04-13T04:22:01.932" v="954" actId="20577"/>
           <ac:spMkLst>
             <pc:docMk/>
             <pc:sldMk cId="3945898909" sldId="267"/>
@@ -1079,7 +1087,7 @@
           </ac:spMkLst>
         </pc:spChg>
         <pc:spChg chg="mod">
-          <ac:chgData name="Ian Wu Ling En" userId="28715549-2f5c-46f8-b7f8-f39c35f3312d" providerId="ADAL" clId="{E7B3513D-77CA-6A41-910B-0B9402F691A1}" dt="2019-04-10T12:22:01.953" v="728" actId="166"/>
+          <ac:chgData name="Ian Wu Ling En" userId="28715549-2f5c-46f8-b7f8-f39c35f3312d" providerId="ADAL" clId="{E7B3513D-77CA-6A41-910B-0B9402F691A1}" dt="2019-04-13T03:48:28.147" v="848" actId="14100"/>
           <ac:spMkLst>
             <pc:docMk/>
             <pc:sldMk cId="3945898909" sldId="267"/>
@@ -1087,7 +1095,7 @@
           </ac:spMkLst>
         </pc:spChg>
         <pc:spChg chg="mod">
-          <ac:chgData name="Ian Wu Ling En" userId="28715549-2f5c-46f8-b7f8-f39c35f3312d" providerId="ADAL" clId="{E7B3513D-77CA-6A41-910B-0B9402F691A1}" dt="2019-04-12T13:47:53.764" v="746" actId="1076"/>
+          <ac:chgData name="Ian Wu Ling En" userId="28715549-2f5c-46f8-b7f8-f39c35f3312d" providerId="ADAL" clId="{E7B3513D-77CA-6A41-910B-0B9402F691A1}" dt="2019-04-13T04:21:41.994" v="948" actId="1076"/>
           <ac:spMkLst>
             <pc:docMk/>
             <pc:sldMk cId="3945898909" sldId="267"/>
@@ -1103,7 +1111,7 @@
           </ac:spMkLst>
         </pc:spChg>
         <pc:spChg chg="mod">
-          <ac:chgData name="Ian Wu Ling En" userId="28715549-2f5c-46f8-b7f8-f39c35f3312d" providerId="ADAL" clId="{E7B3513D-77CA-6A41-910B-0B9402F691A1}" dt="2019-04-10T12:20:57.935" v="720" actId="166"/>
+          <ac:chgData name="Ian Wu Ling En" userId="28715549-2f5c-46f8-b7f8-f39c35f3312d" providerId="ADAL" clId="{E7B3513D-77CA-6A41-910B-0B9402F691A1}" dt="2019-04-13T04:19:42.550" v="905" actId="14100"/>
           <ac:spMkLst>
             <pc:docMk/>
             <pc:sldMk cId="3945898909" sldId="267"/>
@@ -1135,7 +1143,7 @@
           </ac:spMkLst>
         </pc:spChg>
         <pc:spChg chg="mod">
-          <ac:chgData name="Ian Wu Ling En" userId="28715549-2f5c-46f8-b7f8-f39c35f3312d" providerId="ADAL" clId="{E7B3513D-77CA-6A41-910B-0B9402F691A1}" dt="2019-04-10T11:48:40.160" v="344" actId="1076"/>
+          <ac:chgData name="Ian Wu Ling En" userId="28715549-2f5c-46f8-b7f8-f39c35f3312d" providerId="ADAL" clId="{E7B3513D-77CA-6A41-910B-0B9402F691A1}" dt="2019-04-13T04:21:59.792" v="952" actId="20577"/>
           <ac:spMkLst>
             <pc:docMk/>
             <pc:sldMk cId="3945898909" sldId="267"/>
@@ -1182,6 +1190,14 @@
             <ac:spMk id="89" creationId="{E05EBC68-AC66-8647-8F33-8FC249B498C6}"/>
           </ac:spMkLst>
         </pc:spChg>
+        <pc:spChg chg="add del mod">
+          <ac:chgData name="Ian Wu Ling En" userId="28715549-2f5c-46f8-b7f8-f39c35f3312d" providerId="ADAL" clId="{E7B3513D-77CA-6A41-910B-0B9402F691A1}" dt="2019-04-13T01:38:55.567" v="749" actId="478"/>
+          <ac:spMkLst>
+            <pc:docMk/>
+            <pc:sldMk cId="3945898909" sldId="267"/>
+            <ac:spMk id="93" creationId="{8614603B-88B2-0948-9350-77B2B51DFB23}"/>
+          </ac:spMkLst>
+        </pc:spChg>
         <pc:spChg chg="mod">
           <ac:chgData name="Ian Wu Ling En" userId="28715549-2f5c-46f8-b7f8-f39c35f3312d" providerId="ADAL" clId="{E7B3513D-77CA-6A41-910B-0B9402F691A1}" dt="2019-04-10T12:12:55.272" v="680" actId="164"/>
           <ac:spMkLst>
@@ -1199,11 +1215,27 @@
           </ac:spMkLst>
         </pc:spChg>
         <pc:spChg chg="add mod">
+          <ac:chgData name="Ian Wu Ling En" userId="28715549-2f5c-46f8-b7f8-f39c35f3312d" providerId="ADAL" clId="{E7B3513D-77CA-6A41-910B-0B9402F691A1}" dt="2019-04-13T04:18:23.195" v="890" actId="14100"/>
+          <ac:spMkLst>
+            <pc:docMk/>
+            <pc:sldMk cId="3945898909" sldId="267"/>
+            <ac:spMk id="95" creationId="{9499F6F2-4A04-9047-8D5A-2FD1F6DD311F}"/>
+          </ac:spMkLst>
+        </pc:spChg>
+        <pc:spChg chg="add mod">
           <ac:chgData name="Ian Wu Ling En" userId="28715549-2f5c-46f8-b7f8-f39c35f3312d" providerId="ADAL" clId="{E7B3513D-77CA-6A41-910B-0B9402F691A1}" dt="2019-04-10T12:17:52.801" v="710" actId="20577"/>
           <ac:spMkLst>
             <pc:docMk/>
             <pc:sldMk cId="3945898909" sldId="267"/>
             <ac:spMk id="96" creationId="{7116BA0D-401B-BB48-AA36-2BEA0D2D75EE}"/>
+          </ac:spMkLst>
+        </pc:spChg>
+        <pc:spChg chg="add mod">
+          <ac:chgData name="Ian Wu Ling En" userId="28715549-2f5c-46f8-b7f8-f39c35f3312d" providerId="ADAL" clId="{E7B3513D-77CA-6A41-910B-0B9402F691A1}" dt="2019-04-13T03:48:37.544" v="849" actId="1076"/>
+          <ac:spMkLst>
+            <pc:docMk/>
+            <pc:sldMk cId="3945898909" sldId="267"/>
+            <ac:spMk id="97" creationId="{4873ED37-62EB-1242-BD75-3C7E57E41172}"/>
           </ac:spMkLst>
         </pc:spChg>
         <pc:spChg chg="add del mod">
@@ -1230,12 +1262,20 @@
             <ac:spMk id="102" creationId="{6A64BBFD-F360-4345-AC45-8FC9B6DB61D0}"/>
           </ac:spMkLst>
         </pc:spChg>
+        <pc:spChg chg="add del mod">
+          <ac:chgData name="Ian Wu Ling En" userId="28715549-2f5c-46f8-b7f8-f39c35f3312d" providerId="ADAL" clId="{E7B3513D-77CA-6A41-910B-0B9402F691A1}" dt="2019-04-13T01:39:32.750" v="752" actId="478"/>
+          <ac:spMkLst>
+            <pc:docMk/>
+            <pc:sldMk cId="3945898909" sldId="267"/>
+            <ac:spMk id="104" creationId="{5E40F979-1494-C947-A85A-217E0C38A9AD}"/>
+          </ac:spMkLst>
+        </pc:spChg>
         <pc:spChg chg="add mod">
-          <ac:chgData name="Ian Wu Ling En" userId="28715549-2f5c-46f8-b7f8-f39c35f3312d" providerId="ADAL" clId="{E7B3513D-77CA-6A41-910B-0B9402F691A1}" dt="2019-04-10T12:10:17.611" v="642" actId="1076"/>
-          <ac:spMkLst>
-            <pc:docMk/>
-            <pc:sldMk cId="3945898909" sldId="267"/>
-            <ac:spMk id="104" creationId="{5E40F979-1494-C947-A85A-217E0C38A9AD}"/>
+          <ac:chgData name="Ian Wu Ling En" userId="28715549-2f5c-46f8-b7f8-f39c35f3312d" providerId="ADAL" clId="{E7B3513D-77CA-6A41-910B-0B9402F691A1}" dt="2019-04-13T03:48:37.544" v="849" actId="1076"/>
+          <ac:spMkLst>
+            <pc:docMk/>
+            <pc:sldMk cId="3945898909" sldId="267"/>
+            <ac:spMk id="105" creationId="{5202EE9D-B570-F048-97B0-1128F3AFF2E9}"/>
           </ac:spMkLst>
         </pc:spChg>
         <pc:spChg chg="add mod">
@@ -1255,7 +1295,7 @@
           </ac:spMkLst>
         </pc:spChg>
         <pc:spChg chg="add mod">
-          <ac:chgData name="Ian Wu Ling En" userId="28715549-2f5c-46f8-b7f8-f39c35f3312d" providerId="ADAL" clId="{E7B3513D-77CA-6A41-910B-0B9402F691A1}" dt="2019-04-10T12:03:21.085" v="546" actId="1076"/>
+          <ac:chgData name="Ian Wu Ling En" userId="28715549-2f5c-46f8-b7f8-f39c35f3312d" providerId="ADAL" clId="{E7B3513D-77CA-6A41-910B-0B9402F691A1}" dt="2019-04-13T03:48:20.462" v="846" actId="1076"/>
           <ac:spMkLst>
             <pc:docMk/>
             <pc:sldMk cId="3945898909" sldId="267"/>
@@ -1263,7 +1303,7 @@
           </ac:spMkLst>
         </pc:spChg>
         <pc:spChg chg="add mod">
-          <ac:chgData name="Ian Wu Ling En" userId="28715549-2f5c-46f8-b7f8-f39c35f3312d" providerId="ADAL" clId="{E7B3513D-77CA-6A41-910B-0B9402F691A1}" dt="2019-04-10T12:03:21.085" v="546" actId="1076"/>
+          <ac:chgData name="Ian Wu Ling En" userId="28715549-2f5c-46f8-b7f8-f39c35f3312d" providerId="ADAL" clId="{E7B3513D-77CA-6A41-910B-0B9402F691A1}" dt="2019-04-13T03:48:20.462" v="846" actId="1076"/>
           <ac:spMkLst>
             <pc:docMk/>
             <pc:sldMk cId="3945898909" sldId="267"/>
@@ -1303,11 +1343,11 @@
           </ac:spMkLst>
         </pc:spChg>
         <pc:spChg chg="add mod">
-          <ac:chgData name="Ian Wu Ling En" userId="28715549-2f5c-46f8-b7f8-f39c35f3312d" providerId="ADAL" clId="{E7B3513D-77CA-6A41-910B-0B9402F691A1}" dt="2019-04-10T11:47:44.747" v="333" actId="571"/>
-          <ac:spMkLst>
-            <pc:docMk/>
-            <pc:sldMk cId="3945898909" sldId="267"/>
-            <ac:spMk id="123" creationId="{AC0F57F5-C3E6-C24C-9A7F-5EC0DA1833FE}"/>
+          <ac:chgData name="Ian Wu Ling En" userId="28715549-2f5c-46f8-b7f8-f39c35f3312d" providerId="ADAL" clId="{E7B3513D-77CA-6A41-910B-0B9402F691A1}" dt="2019-04-13T04:21:32.003" v="946" actId="1076"/>
+          <ac:spMkLst>
+            <pc:docMk/>
+            <pc:sldMk cId="3945898909" sldId="267"/>
+            <ac:spMk id="122" creationId="{CFEC3571-1124-E34D-85CF-1856E29D0A87}"/>
           </ac:spMkLst>
         </pc:spChg>
         <pc:spChg chg="add mod">
@@ -1315,11 +1355,19 @@
           <ac:spMkLst>
             <pc:docMk/>
             <pc:sldMk cId="3945898909" sldId="267"/>
+            <ac:spMk id="123" creationId="{AC0F57F5-C3E6-C24C-9A7F-5EC0DA1833FE}"/>
+          </ac:spMkLst>
+        </pc:spChg>
+        <pc:spChg chg="add mod">
+          <ac:chgData name="Ian Wu Ling En" userId="28715549-2f5c-46f8-b7f8-f39c35f3312d" providerId="ADAL" clId="{E7B3513D-77CA-6A41-910B-0B9402F691A1}" dt="2019-04-10T11:47:44.747" v="333" actId="571"/>
+          <ac:spMkLst>
+            <pc:docMk/>
+            <pc:sldMk cId="3945898909" sldId="267"/>
             <ac:spMk id="124" creationId="{FC76C14D-CF18-1945-BAFB-77E4D4814791}"/>
           </ac:spMkLst>
         </pc:spChg>
         <pc:spChg chg="add mod">
-          <ac:chgData name="Ian Wu Ling En" userId="28715549-2f5c-46f8-b7f8-f39c35f3312d" providerId="ADAL" clId="{E7B3513D-77CA-6A41-910B-0B9402F691A1}" dt="2019-04-10T12:03:39.015" v="552" actId="1076"/>
+          <ac:chgData name="Ian Wu Ling En" userId="28715549-2f5c-46f8-b7f8-f39c35f3312d" providerId="ADAL" clId="{E7B3513D-77CA-6A41-910B-0B9402F691A1}" dt="2019-04-13T01:41:06.023" v="815" actId="1076"/>
           <ac:spMkLst>
             <pc:docMk/>
             <pc:sldMk cId="3945898909" sldId="267"/>
@@ -1327,7 +1375,7 @@
           </ac:spMkLst>
         </pc:spChg>
         <pc:spChg chg="add mod">
-          <ac:chgData name="Ian Wu Ling En" userId="28715549-2f5c-46f8-b7f8-f39c35f3312d" providerId="ADAL" clId="{E7B3513D-77CA-6A41-910B-0B9402F691A1}" dt="2019-04-10T12:03:21.085" v="546" actId="1076"/>
+          <ac:chgData name="Ian Wu Ling En" userId="28715549-2f5c-46f8-b7f8-f39c35f3312d" providerId="ADAL" clId="{E7B3513D-77CA-6A41-910B-0B9402F691A1}" dt="2019-04-13T04:18:17.379" v="887" actId="14100"/>
           <ac:spMkLst>
             <pc:docMk/>
             <pc:sldMk cId="3945898909" sldId="267"/>
@@ -1367,23 +1415,23 @@
           </ac:spMkLst>
         </pc:spChg>
         <pc:spChg chg="add mod">
-          <ac:chgData name="Ian Wu Ling En" userId="28715549-2f5c-46f8-b7f8-f39c35f3312d" providerId="ADAL" clId="{E7B3513D-77CA-6A41-910B-0B9402F691A1}" dt="2019-04-10T12:08:54.627" v="640" actId="1076"/>
+          <ac:chgData name="Ian Wu Ling En" userId="28715549-2f5c-46f8-b7f8-f39c35f3312d" providerId="ADAL" clId="{E7B3513D-77CA-6A41-910B-0B9402F691A1}" dt="2019-04-13T03:48:20.462" v="846" actId="1076"/>
           <ac:spMkLst>
             <pc:docMk/>
             <pc:sldMk cId="3945898909" sldId="267"/>
             <ac:spMk id="140" creationId="{A72C36BA-2675-E243-B18E-532FAF184C51}"/>
           </ac:spMkLst>
         </pc:spChg>
+        <pc:spChg chg="add del mod">
+          <ac:chgData name="Ian Wu Ling En" userId="28715549-2f5c-46f8-b7f8-f39c35f3312d" providerId="ADAL" clId="{E7B3513D-77CA-6A41-910B-0B9402F691A1}" dt="2019-04-13T01:39:39.454" v="754" actId="478"/>
+          <ac:spMkLst>
+            <pc:docMk/>
+            <pc:sldMk cId="3945898909" sldId="267"/>
+            <ac:spMk id="147" creationId="{7EF6BB41-CD95-364B-BE27-9B810B72FEA8}"/>
+          </ac:spMkLst>
+        </pc:spChg>
         <pc:spChg chg="add mod">
-          <ac:chgData name="Ian Wu Ling En" userId="28715549-2f5c-46f8-b7f8-f39c35f3312d" providerId="ADAL" clId="{E7B3513D-77CA-6A41-910B-0B9402F691A1}" dt="2019-04-10T12:03:21.085" v="546" actId="1076"/>
-          <ac:spMkLst>
-            <pc:docMk/>
-            <pc:sldMk cId="3945898909" sldId="267"/>
-            <ac:spMk id="147" creationId="{7EF6BB41-CD95-364B-BE27-9B810B72FEA8}"/>
-          </ac:spMkLst>
-        </pc:spChg>
-        <pc:spChg chg="add mod">
-          <ac:chgData name="Ian Wu Ling En" userId="28715549-2f5c-46f8-b7f8-f39c35f3312d" providerId="ADAL" clId="{E7B3513D-77CA-6A41-910B-0B9402F691A1}" dt="2019-04-10T12:05:25.263" v="580" actId="571"/>
+          <ac:chgData name="Ian Wu Ling En" userId="28715549-2f5c-46f8-b7f8-f39c35f3312d" providerId="ADAL" clId="{E7B3513D-77CA-6A41-910B-0B9402F691A1}" dt="2019-04-13T04:19:18.132" v="901" actId="1076"/>
           <ac:spMkLst>
             <pc:docMk/>
             <pc:sldMk cId="3945898909" sldId="267"/>
@@ -1399,7 +1447,7 @@
           </ac:spMkLst>
         </pc:spChg>
         <pc:spChg chg="add mod">
-          <ac:chgData name="Ian Wu Ling En" userId="28715549-2f5c-46f8-b7f8-f39c35f3312d" providerId="ADAL" clId="{E7B3513D-77CA-6A41-910B-0B9402F691A1}" dt="2019-04-12T13:47:34.480" v="741" actId="14100"/>
+          <ac:chgData name="Ian Wu Ling En" userId="28715549-2f5c-46f8-b7f8-f39c35f3312d" providerId="ADAL" clId="{E7B3513D-77CA-6A41-910B-0B9402F691A1}" dt="2019-04-13T04:21:05.706" v="921" actId="14100"/>
           <ac:spMkLst>
             <pc:docMk/>
             <pc:sldMk cId="3945898909" sldId="267"/>
@@ -1407,7 +1455,7 @@
           </ac:spMkLst>
         </pc:spChg>
         <pc:spChg chg="add mod">
-          <ac:chgData name="Ian Wu Ling En" userId="28715549-2f5c-46f8-b7f8-f39c35f3312d" providerId="ADAL" clId="{E7B3513D-77CA-6A41-910B-0B9402F691A1}" dt="2019-04-12T13:47:34.480" v="741" actId="14100"/>
+          <ac:chgData name="Ian Wu Ling En" userId="28715549-2f5c-46f8-b7f8-f39c35f3312d" providerId="ADAL" clId="{E7B3513D-77CA-6A41-910B-0B9402F691A1}" dt="2019-04-13T04:21:05.706" v="921" actId="14100"/>
           <ac:spMkLst>
             <pc:docMk/>
             <pc:sldMk cId="3945898909" sldId="267"/>
@@ -1423,7 +1471,7 @@
           </ac:spMkLst>
         </pc:spChg>
         <pc:spChg chg="mod topLvl">
-          <ac:chgData name="Ian Wu Ling En" userId="28715549-2f5c-46f8-b7f8-f39c35f3312d" providerId="ADAL" clId="{E7B3513D-77CA-6A41-910B-0B9402F691A1}" dt="2019-04-12T13:47:04.176" v="735" actId="165"/>
+          <ac:chgData name="Ian Wu Ling En" userId="28715549-2f5c-46f8-b7f8-f39c35f3312d" providerId="ADAL" clId="{E7B3513D-77CA-6A41-910B-0B9402F691A1}" dt="2019-04-13T04:18:38.203" v="893" actId="14100"/>
           <ac:spMkLst>
             <pc:docMk/>
             <pc:sldMk cId="3945898909" sldId="267"/>
@@ -1439,15 +1487,23 @@
           </ac:spMkLst>
         </pc:spChg>
         <pc:spChg chg="mod">
-          <ac:chgData name="Ian Wu Ling En" userId="28715549-2f5c-46f8-b7f8-f39c35f3312d" providerId="ADAL" clId="{E7B3513D-77CA-6A41-910B-0B9402F691A1}" dt="2019-04-10T11:54:18.612" v="440" actId="1076"/>
+          <ac:chgData name="Ian Wu Ling En" userId="28715549-2f5c-46f8-b7f8-f39c35f3312d" providerId="ADAL" clId="{E7B3513D-77CA-6A41-910B-0B9402F691A1}" dt="2019-04-13T03:50:10.098" v="864" actId="1076"/>
           <ac:spMkLst>
             <pc:docMk/>
             <pc:sldMk cId="3945898909" sldId="267"/>
             <ac:spMk id="213" creationId="{199F746E-405B-485A-994E-C0C45F8824D7}"/>
           </ac:spMkLst>
         </pc:spChg>
-        <pc:grpChg chg="add mod">
-          <ac:chgData name="Ian Wu Ling En" userId="28715549-2f5c-46f8-b7f8-f39c35f3312d" providerId="ADAL" clId="{E7B3513D-77CA-6A41-910B-0B9402F691A1}" dt="2019-04-10T12:03:21.085" v="546" actId="1076"/>
+        <pc:spChg chg="mod">
+          <ac:chgData name="Ian Wu Ling En" userId="28715549-2f5c-46f8-b7f8-f39c35f3312d" providerId="ADAL" clId="{E7B3513D-77CA-6A41-910B-0B9402F691A1}" dt="2019-04-13T03:50:19.318" v="867" actId="1076"/>
+          <ac:spMkLst>
+            <pc:docMk/>
+            <pc:sldMk cId="3945898909" sldId="267"/>
+            <ac:spMk id="214" creationId="{22493782-DEC3-436C-AC2C-EE03A965A6F0}"/>
+          </ac:spMkLst>
+        </pc:spChg>
+        <pc:grpChg chg="add del mod">
+          <ac:chgData name="Ian Wu Ling En" userId="28715549-2f5c-46f8-b7f8-f39c35f3312d" providerId="ADAL" clId="{E7B3513D-77CA-6A41-910B-0B9402F691A1}" dt="2019-04-13T01:39:34.032" v="753" actId="478"/>
           <ac:grpSpMkLst>
             <pc:docMk/>
             <pc:sldMk cId="3945898909" sldId="267"/>
@@ -1455,7 +1511,7 @@
           </ac:grpSpMkLst>
         </pc:grpChg>
         <pc:grpChg chg="add mod">
-          <ac:chgData name="Ian Wu Ling En" userId="28715549-2f5c-46f8-b7f8-f39c35f3312d" providerId="ADAL" clId="{E7B3513D-77CA-6A41-910B-0B9402F691A1}" dt="2019-04-10T12:06:00.749" v="601" actId="1035"/>
+          <ac:chgData name="Ian Wu Ling En" userId="28715549-2f5c-46f8-b7f8-f39c35f3312d" providerId="ADAL" clId="{E7B3513D-77CA-6A41-910B-0B9402F691A1}" dt="2019-04-13T04:19:18.132" v="901" actId="1076"/>
           <ac:grpSpMkLst>
             <pc:docMk/>
             <pc:sldMk cId="3945898909" sldId="267"/>
@@ -1471,7 +1527,7 @@
           </ac:grpSpMkLst>
         </pc:grpChg>
         <pc:grpChg chg="add mod">
-          <ac:chgData name="Ian Wu Ling En" userId="28715549-2f5c-46f8-b7f8-f39c35f3312d" providerId="ADAL" clId="{E7B3513D-77CA-6A41-910B-0B9402F691A1}" dt="2019-04-10T12:12:56.773" v="681" actId="1076"/>
+          <ac:chgData name="Ian Wu Ling En" userId="28715549-2f5c-46f8-b7f8-f39c35f3312d" providerId="ADAL" clId="{E7B3513D-77CA-6A41-910B-0B9402F691A1}" dt="2019-04-13T04:19:47.295" v="907" actId="1036"/>
           <ac:grpSpMkLst>
             <pc:docMk/>
             <pc:sldMk cId="3945898909" sldId="267"/>
@@ -1479,7 +1535,7 @@
           </ac:grpSpMkLst>
         </pc:grpChg>
         <pc:grpChg chg="add mod">
-          <ac:chgData name="Ian Wu Ling En" userId="28715549-2f5c-46f8-b7f8-f39c35f3312d" providerId="ADAL" clId="{E7B3513D-77CA-6A41-910B-0B9402F691A1}" dt="2019-04-10T12:13:18.008" v="684" actId="1076"/>
+          <ac:chgData name="Ian Wu Ling En" userId="28715549-2f5c-46f8-b7f8-f39c35f3312d" providerId="ADAL" clId="{E7B3513D-77CA-6A41-910B-0B9402F691A1}" dt="2019-04-13T04:19:24.675" v="904" actId="1076"/>
           <ac:grpSpMkLst>
             <pc:docMk/>
             <pc:sldMk cId="3945898909" sldId="267"/>
@@ -1495,7 +1551,7 @@
           </ac:grpSpMkLst>
         </pc:grpChg>
         <pc:cxnChg chg="mod">
-          <ac:chgData name="Ian Wu Ling En" userId="28715549-2f5c-46f8-b7f8-f39c35f3312d" providerId="ADAL" clId="{E7B3513D-77CA-6A41-910B-0B9402F691A1}" dt="2019-04-10T12:14:57.207" v="704" actId="14100"/>
+          <ac:chgData name="Ian Wu Ling En" userId="28715549-2f5c-46f8-b7f8-f39c35f3312d" providerId="ADAL" clId="{E7B3513D-77CA-6A41-910B-0B9402F691A1}" dt="2019-04-13T04:21:39.501" v="947" actId="14100"/>
           <ac:cxnSpMkLst>
             <pc:docMk/>
             <pc:sldMk cId="3945898909" sldId="267"/>
@@ -1511,7 +1567,7 @@
           </ac:cxnSpMkLst>
         </pc:cxnChg>
         <pc:cxnChg chg="mod">
-          <ac:chgData name="Ian Wu Ling En" userId="28715549-2f5c-46f8-b7f8-f39c35f3312d" providerId="ADAL" clId="{E7B3513D-77CA-6A41-910B-0B9402F691A1}" dt="2019-04-10T11:48:40.160" v="344" actId="1076"/>
+          <ac:chgData name="Ian Wu Ling En" userId="28715549-2f5c-46f8-b7f8-f39c35f3312d" providerId="ADAL" clId="{E7B3513D-77CA-6A41-910B-0B9402F691A1}" dt="2019-04-13T04:19:58.564" v="909" actId="14100"/>
           <ac:cxnSpMkLst>
             <pc:docMk/>
             <pc:sldMk cId="3945898909" sldId="267"/>
@@ -1519,7 +1575,7 @@
           </ac:cxnSpMkLst>
         </pc:cxnChg>
         <pc:cxnChg chg="mod">
-          <ac:chgData name="Ian Wu Ling En" userId="28715549-2f5c-46f8-b7f8-f39c35f3312d" providerId="ADAL" clId="{E7B3513D-77CA-6A41-910B-0B9402F691A1}" dt="2019-04-10T11:48:40.160" v="344" actId="1076"/>
+          <ac:chgData name="Ian Wu Ling En" userId="28715549-2f5c-46f8-b7f8-f39c35f3312d" providerId="ADAL" clId="{E7B3513D-77CA-6A41-910B-0B9402F691A1}" dt="2019-04-13T04:19:53.983" v="908" actId="14100"/>
           <ac:cxnSpMkLst>
             <pc:docMk/>
             <pc:sldMk cId="3945898909" sldId="267"/>
@@ -1567,7 +1623,7 @@
           </ac:cxnSpMkLst>
         </pc:cxnChg>
         <pc:cxnChg chg="mod">
-          <ac:chgData name="Ian Wu Ling En" userId="28715549-2f5c-46f8-b7f8-f39c35f3312d" providerId="ADAL" clId="{E7B3513D-77CA-6A41-910B-0B9402F691A1}" dt="2019-04-12T13:47:38.032" v="742" actId="14100"/>
+          <ac:chgData name="Ian Wu Ling En" userId="28715549-2f5c-46f8-b7f8-f39c35f3312d" providerId="ADAL" clId="{E7B3513D-77CA-6A41-910B-0B9402F691A1}" dt="2019-04-13T04:20:24.300" v="914" actId="14100"/>
           <ac:cxnSpMkLst>
             <pc:docMk/>
             <pc:sldMk cId="3945898909" sldId="267"/>
@@ -1575,7 +1631,7 @@
           </ac:cxnSpMkLst>
         </pc:cxnChg>
         <pc:cxnChg chg="mod">
-          <ac:chgData name="Ian Wu Ling En" userId="28715549-2f5c-46f8-b7f8-f39c35f3312d" providerId="ADAL" clId="{E7B3513D-77CA-6A41-910B-0B9402F691A1}" dt="2019-04-10T12:20:26.745" v="714" actId="14100"/>
+          <ac:chgData name="Ian Wu Ling En" userId="28715549-2f5c-46f8-b7f8-f39c35f3312d" providerId="ADAL" clId="{E7B3513D-77CA-6A41-910B-0B9402F691A1}" dt="2019-04-13T03:48:44.073" v="851" actId="14100"/>
           <ac:cxnSpMkLst>
             <pc:docMk/>
             <pc:sldMk cId="3945898909" sldId="267"/>
@@ -1639,7 +1695,7 @@
           </ac:cxnSpMkLst>
         </pc:cxnChg>
         <pc:cxnChg chg="mod">
-          <ac:chgData name="Ian Wu Ling En" userId="28715549-2f5c-46f8-b7f8-f39c35f3312d" providerId="ADAL" clId="{E7B3513D-77CA-6A41-910B-0B9402F691A1}" dt="2019-04-10T12:13:26.220" v="685" actId="14100"/>
+          <ac:chgData name="Ian Wu Ling En" userId="28715549-2f5c-46f8-b7f8-f39c35f3312d" providerId="ADAL" clId="{E7B3513D-77CA-6A41-910B-0B9402F691A1}" dt="2019-04-13T04:21:51.129" v="949" actId="14100"/>
           <ac:cxnSpMkLst>
             <pc:docMk/>
             <pc:sldMk cId="3945898909" sldId="267"/>
@@ -1687,6 +1743,46 @@
           </ac:cxnSpMkLst>
         </pc:cxnChg>
         <pc:cxnChg chg="add mod">
+          <ac:chgData name="Ian Wu Ling En" userId="28715549-2f5c-46f8-b7f8-f39c35f3312d" providerId="ADAL" clId="{E7B3513D-77CA-6A41-910B-0B9402F691A1}" dt="2019-04-13T03:47:54.750" v="842" actId="1035"/>
+          <ac:cxnSpMkLst>
+            <pc:docMk/>
+            <pc:sldMk cId="3945898909" sldId="267"/>
+            <ac:cxnSpMk id="92" creationId="{BB3190FB-CC68-A046-AA74-31A0A577EAE8}"/>
+          </ac:cxnSpMkLst>
+        </pc:cxnChg>
+        <pc:cxnChg chg="add del">
+          <ac:chgData name="Ian Wu Ling En" userId="28715549-2f5c-46f8-b7f8-f39c35f3312d" providerId="ADAL" clId="{E7B3513D-77CA-6A41-910B-0B9402F691A1}" dt="2019-04-13T01:40:20.225" v="766"/>
+          <ac:cxnSpMkLst>
+            <pc:docMk/>
+            <pc:sldMk cId="3945898909" sldId="267"/>
+            <ac:cxnSpMk id="98" creationId="{D3B60830-9BA1-364C-9004-EEBFD7473995}"/>
+          </ac:cxnSpMkLst>
+        </pc:cxnChg>
+        <pc:cxnChg chg="add mod">
+          <ac:chgData name="Ian Wu Ling En" userId="28715549-2f5c-46f8-b7f8-f39c35f3312d" providerId="ADAL" clId="{E7B3513D-77CA-6A41-910B-0B9402F691A1}" dt="2019-04-13T03:48:37.544" v="849" actId="1076"/>
+          <ac:cxnSpMkLst>
+            <pc:docMk/>
+            <pc:sldMk cId="3945898909" sldId="267"/>
+            <ac:cxnSpMk id="99" creationId="{FEFC6A07-EAC7-D04C-BA68-56DCED02C5D2}"/>
+          </ac:cxnSpMkLst>
+        </pc:cxnChg>
+        <pc:cxnChg chg="add mod">
+          <ac:chgData name="Ian Wu Ling En" userId="28715549-2f5c-46f8-b7f8-f39c35f3312d" providerId="ADAL" clId="{E7B3513D-77CA-6A41-910B-0B9402F691A1}" dt="2019-04-13T03:48:37.544" v="849" actId="1076"/>
+          <ac:cxnSpMkLst>
+            <pc:docMk/>
+            <pc:sldMk cId="3945898909" sldId="267"/>
+            <ac:cxnSpMk id="100" creationId="{4C797AB4-53E0-DC4C-9150-011C43CE8065}"/>
+          </ac:cxnSpMkLst>
+        </pc:cxnChg>
+        <pc:cxnChg chg="add del mod">
+          <ac:chgData name="Ian Wu Ling En" userId="28715549-2f5c-46f8-b7f8-f39c35f3312d" providerId="ADAL" clId="{E7B3513D-77CA-6A41-910B-0B9402F691A1}" dt="2019-04-13T03:51:34.310" v="880" actId="478"/>
+          <ac:cxnSpMkLst>
+            <pc:docMk/>
+            <pc:sldMk cId="3945898909" sldId="267"/>
+            <ac:cxnSpMk id="101" creationId="{0291C360-81EE-574E-8133-5197CA0AAE40}"/>
+          </ac:cxnSpMkLst>
+        </pc:cxnChg>
+        <pc:cxnChg chg="add mod">
           <ac:chgData name="Ian Wu Ling En" userId="28715549-2f5c-46f8-b7f8-f39c35f3312d" providerId="ADAL" clId="{E7B3513D-77CA-6A41-910B-0B9402F691A1}" dt="2019-04-10T11:57:32.639" v="465" actId="164"/>
           <ac:cxnSpMkLst>
             <pc:docMk/>
@@ -1703,7 +1799,15 @@
           </ac:cxnSpMkLst>
         </pc:cxnChg>
         <pc:cxnChg chg="add mod">
-          <ac:chgData name="Ian Wu Ling En" userId="28715549-2f5c-46f8-b7f8-f39c35f3312d" providerId="ADAL" clId="{E7B3513D-77CA-6A41-910B-0B9402F691A1}" dt="2019-04-10T12:03:21.085" v="546" actId="1076"/>
+          <ac:chgData name="Ian Wu Ling En" userId="28715549-2f5c-46f8-b7f8-f39c35f3312d" providerId="ADAL" clId="{E7B3513D-77CA-6A41-910B-0B9402F691A1}" dt="2019-04-13T04:18:35.029" v="892" actId="14100"/>
+          <ac:cxnSpMkLst>
+            <pc:docMk/>
+            <pc:sldMk cId="3945898909" sldId="267"/>
+            <ac:cxnSpMk id="107" creationId="{A901C160-EAAB-B84F-A3CB-29327EB10D48}"/>
+          </ac:cxnSpMkLst>
+        </pc:cxnChg>
+        <pc:cxnChg chg="add mod">
+          <ac:chgData name="Ian Wu Ling En" userId="28715549-2f5c-46f8-b7f8-f39c35f3312d" providerId="ADAL" clId="{E7B3513D-77CA-6A41-910B-0B9402F691A1}" dt="2019-04-13T03:48:20.462" v="846" actId="1076"/>
           <ac:cxnSpMkLst>
             <pc:docMk/>
             <pc:sldMk cId="3945898909" sldId="267"/>
@@ -1711,7 +1815,7 @@
           </ac:cxnSpMkLst>
         </pc:cxnChg>
         <pc:cxnChg chg="add mod">
-          <ac:chgData name="Ian Wu Ling En" userId="28715549-2f5c-46f8-b7f8-f39c35f3312d" providerId="ADAL" clId="{E7B3513D-77CA-6A41-910B-0B9402F691A1}" dt="2019-04-12T13:47:41.270" v="743" actId="14100"/>
+          <ac:chgData name="Ian Wu Ling En" userId="28715549-2f5c-46f8-b7f8-f39c35f3312d" providerId="ADAL" clId="{E7B3513D-77CA-6A41-910B-0B9402F691A1}" dt="2019-04-13T04:20:27.918" v="915" actId="14100"/>
           <ac:cxnSpMkLst>
             <pc:docMk/>
             <pc:sldMk cId="3945898909" sldId="267"/>
@@ -1719,7 +1823,7 @@
           </ac:cxnSpMkLst>
         </pc:cxnChg>
         <pc:cxnChg chg="add mod">
-          <ac:chgData name="Ian Wu Ling En" userId="28715549-2f5c-46f8-b7f8-f39c35f3312d" providerId="ADAL" clId="{E7B3513D-77CA-6A41-910B-0B9402F691A1}" dt="2019-04-10T12:08:39.095" v="639" actId="1076"/>
+          <ac:chgData name="Ian Wu Ling En" userId="28715549-2f5c-46f8-b7f8-f39c35f3312d" providerId="ADAL" clId="{E7B3513D-77CA-6A41-910B-0B9402F691A1}" dt="2019-04-13T03:48:20.462" v="846" actId="1076"/>
           <ac:cxnSpMkLst>
             <pc:docMk/>
             <pc:sldMk cId="3945898909" sldId="267"/>
@@ -1734,6 +1838,14 @@
             <ac:cxnSpMk id="116" creationId="{5264DAAA-D48A-9E4A-991A-AEA8674B7EDB}"/>
           </ac:cxnSpMkLst>
         </pc:cxnChg>
+        <pc:cxnChg chg="add del mod">
+          <ac:chgData name="Ian Wu Ling En" userId="28715549-2f5c-46f8-b7f8-f39c35f3312d" providerId="ADAL" clId="{E7B3513D-77CA-6A41-910B-0B9402F691A1}" dt="2019-04-13T04:20:37.043" v="918" actId="478"/>
+          <ac:cxnSpMkLst>
+            <pc:docMk/>
+            <pc:sldMk cId="3945898909" sldId="267"/>
+            <ac:cxnSpMk id="116" creationId="{76B1E441-19D1-6444-A7FA-0B9D5A23E18C}"/>
+          </ac:cxnSpMkLst>
+        </pc:cxnChg>
         <pc:cxnChg chg="add mod">
           <ac:chgData name="Ian Wu Ling En" userId="28715549-2f5c-46f8-b7f8-f39c35f3312d" providerId="ADAL" clId="{E7B3513D-77CA-6A41-910B-0B9402F691A1}" dt="2019-04-10T11:47:44.747" v="333" actId="571"/>
           <ac:cxnSpMkLst>
@@ -1759,7 +1871,7 @@
           </ac:cxnSpMkLst>
         </pc:cxnChg>
         <pc:cxnChg chg="add mod">
-          <ac:chgData name="Ian Wu Ling En" userId="28715549-2f5c-46f8-b7f8-f39c35f3312d" providerId="ADAL" clId="{E7B3513D-77CA-6A41-910B-0B9402F691A1}" dt="2019-04-12T13:47:44.527" v="744" actId="14100"/>
+          <ac:chgData name="Ian Wu Ling En" userId="28715549-2f5c-46f8-b7f8-f39c35f3312d" providerId="ADAL" clId="{E7B3513D-77CA-6A41-910B-0B9402F691A1}" dt="2019-04-13T04:20:31.410" v="916" actId="14100"/>
           <ac:cxnSpMkLst>
             <pc:docMk/>
             <pc:sldMk cId="3945898909" sldId="267"/>
@@ -1823,7 +1935,7 @@
           </ac:cxnSpMkLst>
         </pc:cxnChg>
         <pc:cxnChg chg="add mod">
-          <ac:chgData name="Ian Wu Ling En" userId="28715549-2f5c-46f8-b7f8-f39c35f3312d" providerId="ADAL" clId="{E7B3513D-77CA-6A41-910B-0B9402F691A1}" dt="2019-04-10T12:20:42.037" v="717" actId="14100"/>
+          <ac:chgData name="Ian Wu Ling En" userId="28715549-2f5c-46f8-b7f8-f39c35f3312d" providerId="ADAL" clId="{E7B3513D-77CA-6A41-910B-0B9402F691A1}" dt="2019-04-13T04:19:18.132" v="901" actId="1076"/>
           <ac:cxnSpMkLst>
             <pc:docMk/>
             <pc:sldMk cId="3945898909" sldId="267"/>
@@ -1831,7 +1943,7 @@
           </ac:cxnSpMkLst>
         </pc:cxnChg>
         <pc:cxnChg chg="add mod">
-          <ac:chgData name="Ian Wu Ling En" userId="28715549-2f5c-46f8-b7f8-f39c35f3312d" providerId="ADAL" clId="{E7B3513D-77CA-6A41-910B-0B9402F691A1}" dt="2019-04-10T12:11:27.565" v="648" actId="571"/>
+          <ac:chgData name="Ian Wu Ling En" userId="28715549-2f5c-46f8-b7f8-f39c35f3312d" providerId="ADAL" clId="{E7B3513D-77CA-6A41-910B-0B9402F691A1}" dt="2019-04-13T04:19:18.132" v="901" actId="1076"/>
           <ac:cxnSpMkLst>
             <pc:docMk/>
             <pc:sldMk cId="3945898909" sldId="267"/>
@@ -1847,7 +1959,7 @@
           </ac:cxnSpMkLst>
         </pc:cxnChg>
         <pc:cxnChg chg="mod">
-          <ac:chgData name="Ian Wu Ling En" userId="28715549-2f5c-46f8-b7f8-f39c35f3312d" providerId="ADAL" clId="{E7B3513D-77CA-6A41-910B-0B9402F691A1}" dt="2019-04-12T13:47:48.472" v="745" actId="14100"/>
+          <ac:chgData name="Ian Wu Ling En" userId="28715549-2f5c-46f8-b7f8-f39c35f3312d" providerId="ADAL" clId="{E7B3513D-77CA-6A41-910B-0B9402F691A1}" dt="2019-04-13T04:20:34.905" v="917" actId="14100"/>
           <ac:cxnSpMkLst>
             <pc:docMk/>
             <pc:sldMk cId="3945898909" sldId="267"/>
@@ -1855,7 +1967,7 @@
           </ac:cxnSpMkLst>
         </pc:cxnChg>
         <pc:cxnChg chg="mod">
-          <ac:chgData name="Ian Wu Ling En" userId="28715549-2f5c-46f8-b7f8-f39c35f3312d" providerId="ADAL" clId="{E7B3513D-77CA-6A41-910B-0B9402F691A1}" dt="2019-04-10T12:08:19.031" v="638" actId="1076"/>
+          <ac:chgData name="Ian Wu Ling En" userId="28715549-2f5c-46f8-b7f8-f39c35f3312d" providerId="ADAL" clId="{E7B3513D-77CA-6A41-910B-0B9402F691A1}" dt="2019-04-13T04:18:42.829" v="894" actId="1076"/>
           <ac:cxnSpMkLst>
             <pc:docMk/>
             <pc:sldMk cId="3945898909" sldId="267"/>
@@ -1863,7 +1975,7 @@
           </ac:cxnSpMkLst>
         </pc:cxnChg>
         <pc:cxnChg chg="mod">
-          <ac:chgData name="Ian Wu Ling En" userId="28715549-2f5c-46f8-b7f8-f39c35f3312d" providerId="ADAL" clId="{E7B3513D-77CA-6A41-910B-0B9402F691A1}" dt="2019-04-10T12:03:21.085" v="546" actId="1076"/>
+          <ac:chgData name="Ian Wu Ling En" userId="28715549-2f5c-46f8-b7f8-f39c35f3312d" providerId="ADAL" clId="{E7B3513D-77CA-6A41-910B-0B9402F691A1}" dt="2019-04-13T03:48:23.998" v="847" actId="1076"/>
           <ac:cxnSpMkLst>
             <pc:docMk/>
             <pc:sldMk cId="3945898909" sldId="267"/>
@@ -1871,7 +1983,15 @@
           </ac:cxnSpMkLst>
         </pc:cxnChg>
         <pc:cxnChg chg="mod">
-          <ac:chgData name="Ian Wu Ling En" userId="28715549-2f5c-46f8-b7f8-f39c35f3312d" providerId="ADAL" clId="{E7B3513D-77CA-6A41-910B-0B9402F691A1}" dt="2019-04-10T12:13:14.893" v="683" actId="164"/>
+          <ac:chgData name="Ian Wu Ling En" userId="28715549-2f5c-46f8-b7f8-f39c35f3312d" providerId="ADAL" clId="{E7B3513D-77CA-6A41-910B-0B9402F691A1}" dt="2019-04-13T03:50:19.318" v="867" actId="1076"/>
+          <ac:cxnSpMkLst>
+            <pc:docMk/>
+            <pc:sldMk cId="3945898909" sldId="267"/>
+            <ac:cxnSpMk id="215" creationId="{0963EC8C-EF55-4B35-820F-72F93A5056C6}"/>
+          </ac:cxnSpMkLst>
+        </pc:cxnChg>
+        <pc:cxnChg chg="mod">
+          <ac:chgData name="Ian Wu Ling En" userId="28715549-2f5c-46f8-b7f8-f39c35f3312d" providerId="ADAL" clId="{E7B3513D-77CA-6A41-910B-0B9402F691A1}" dt="2019-04-13T03:50:08.248" v="863" actId="14100"/>
           <ac:cxnSpMkLst>
             <pc:docMk/>
             <pc:sldMk cId="3945898909" sldId="267"/>
@@ -1879,7 +1999,7 @@
           </ac:cxnSpMkLst>
         </pc:cxnChg>
         <pc:cxnChg chg="mod">
-          <ac:chgData name="Ian Wu Ling En" userId="28715549-2f5c-46f8-b7f8-f39c35f3312d" providerId="ADAL" clId="{E7B3513D-77CA-6A41-910B-0B9402F691A1}" dt="2019-04-10T12:13:14.893" v="683" actId="164"/>
+          <ac:chgData name="Ian Wu Ling En" userId="28715549-2f5c-46f8-b7f8-f39c35f3312d" providerId="ADAL" clId="{E7B3513D-77CA-6A41-910B-0B9402F691A1}" dt="2019-04-13T03:50:35.517" v="870" actId="14100"/>
           <ac:cxnSpMkLst>
             <pc:docMk/>
             <pc:sldMk cId="3945898909" sldId="267"/>
@@ -2247,7 +2367,7 @@
           <a:p>
             <a:fld id="{F5CC4B3F-88C1-4FFA-B1B6-F41C21DC6924}" type="datetimeFigureOut">
               <a:rPr lang="en-US" smtClean="0"/>
-              <a:t>4/12/19</a:t>
+              <a:t>4/13/19</a:t>
             </a:fld>
             <a:endParaRPr lang="en-US"/>
           </a:p>
@@ -2782,7 +2902,7 @@
           <a:p>
             <a:fld id="{78C97017-6FC3-485B-9764-EAC9E56C1D49}" type="datetimeFigureOut">
               <a:rPr lang="en-US" smtClean="0"/>
-              <a:t>4/12/19</a:t>
+              <a:t>4/13/19</a:t>
             </a:fld>
             <a:endParaRPr lang="en-US"/>
           </a:p>
@@ -2950,7 +3070,7 @@
           <a:p>
             <a:fld id="{78C97017-6FC3-485B-9764-EAC9E56C1D49}" type="datetimeFigureOut">
               <a:rPr lang="en-US" smtClean="0"/>
-              <a:t>4/12/19</a:t>
+              <a:t>4/13/19</a:t>
             </a:fld>
             <a:endParaRPr lang="en-US"/>
           </a:p>
@@ -3128,7 +3248,7 @@
           <a:p>
             <a:fld id="{78C97017-6FC3-485B-9764-EAC9E56C1D49}" type="datetimeFigureOut">
               <a:rPr lang="en-US" smtClean="0"/>
-              <a:t>4/12/19</a:t>
+              <a:t>4/13/19</a:t>
             </a:fld>
             <a:endParaRPr lang="en-US"/>
           </a:p>
@@ -3296,7 +3416,7 @@
           <a:p>
             <a:fld id="{78C97017-6FC3-485B-9764-EAC9E56C1D49}" type="datetimeFigureOut">
               <a:rPr lang="en-US" smtClean="0"/>
-              <a:t>4/12/19</a:t>
+              <a:t>4/13/19</a:t>
             </a:fld>
             <a:endParaRPr lang="en-US"/>
           </a:p>
@@ -3541,7 +3661,7 @@
           <a:p>
             <a:fld id="{78C97017-6FC3-485B-9764-EAC9E56C1D49}" type="datetimeFigureOut">
               <a:rPr lang="en-US" smtClean="0"/>
-              <a:t>4/12/19</a:t>
+              <a:t>4/13/19</a:t>
             </a:fld>
             <a:endParaRPr lang="en-US"/>
           </a:p>
@@ -3826,7 +3946,7 @@
           <a:p>
             <a:fld id="{78C97017-6FC3-485B-9764-EAC9E56C1D49}" type="datetimeFigureOut">
               <a:rPr lang="en-US" smtClean="0"/>
-              <a:t>4/12/19</a:t>
+              <a:t>4/13/19</a:t>
             </a:fld>
             <a:endParaRPr lang="en-US"/>
           </a:p>
@@ -4245,7 +4365,7 @@
           <a:p>
             <a:fld id="{78C97017-6FC3-485B-9764-EAC9E56C1D49}" type="datetimeFigureOut">
               <a:rPr lang="en-US" smtClean="0"/>
-              <a:t>4/12/19</a:t>
+              <a:t>4/13/19</a:t>
             </a:fld>
             <a:endParaRPr lang="en-US"/>
           </a:p>
@@ -4362,7 +4482,7 @@
           <a:p>
             <a:fld id="{78C97017-6FC3-485B-9764-EAC9E56C1D49}" type="datetimeFigureOut">
               <a:rPr lang="en-US" smtClean="0"/>
-              <a:t>4/12/19</a:t>
+              <a:t>4/13/19</a:t>
             </a:fld>
             <a:endParaRPr lang="en-US"/>
           </a:p>
@@ -4457,7 +4577,7 @@
           <a:p>
             <a:fld id="{78C97017-6FC3-485B-9764-EAC9E56C1D49}" type="datetimeFigureOut">
               <a:rPr lang="en-US" smtClean="0"/>
-              <a:t>4/12/19</a:t>
+              <a:t>4/13/19</a:t>
             </a:fld>
             <a:endParaRPr lang="en-US"/>
           </a:p>
@@ -4732,7 +4852,7 @@
           <a:p>
             <a:fld id="{78C97017-6FC3-485B-9764-EAC9E56C1D49}" type="datetimeFigureOut">
               <a:rPr lang="en-US" smtClean="0"/>
-              <a:t>4/12/19</a:t>
+              <a:t>4/13/19</a:t>
             </a:fld>
             <a:endParaRPr lang="en-US"/>
           </a:p>
@@ -4984,7 +5104,7 @@
           <a:p>
             <a:fld id="{78C97017-6FC3-485B-9764-EAC9E56C1D49}" type="datetimeFigureOut">
               <a:rPr lang="en-US" smtClean="0"/>
-              <a:t>4/12/19</a:t>
+              <a:t>4/13/19</a:t>
             </a:fld>
             <a:endParaRPr lang="en-US"/>
           </a:p>
@@ -5195,7 +5315,7 @@
           <a:p>
             <a:fld id="{78C97017-6FC3-485B-9764-EAC9E56C1D49}" type="datetimeFigureOut">
               <a:rPr lang="en-US" smtClean="0"/>
-              <a:t>4/12/19</a:t>
+              <a:t>4/13/19</a:t>
             </a:fld>
             <a:endParaRPr lang="en-US"/>
           </a:p>
@@ -5584,8 +5704,8 @@
         </p:nvSpPr>
         <p:spPr>
           <a:xfrm>
-            <a:off x="9699812" y="296676"/>
-            <a:ext cx="7075272" cy="10908136"/>
+            <a:off x="9699812" y="943897"/>
+            <a:ext cx="6277250" cy="8436078"/>
           </a:xfrm>
           <a:prstGeom prst="roundRect">
             <a:avLst>
@@ -5651,8 +5771,8 @@
         </p:nvSpPr>
         <p:spPr>
           <a:xfrm>
-            <a:off x="243124" y="261257"/>
-            <a:ext cx="9336305" cy="10908137"/>
+            <a:off x="243124" y="908478"/>
+            <a:ext cx="9336305" cy="8436079"/>
           </a:xfrm>
           <a:prstGeom prst="roundRect">
             <a:avLst>
@@ -5721,8 +5841,8 @@
         </p:nvCxnSpPr>
         <p:spPr>
           <a:xfrm>
-            <a:off x="8065841" y="2759825"/>
-            <a:ext cx="0" cy="8049415"/>
+            <a:off x="8065841" y="3169085"/>
+            <a:ext cx="0" cy="5953270"/>
           </a:xfrm>
           <a:prstGeom prst="line">
             <a:avLst/>
@@ -5820,7 +5940,7 @@
         <p:spPr>
           <a:xfrm>
             <a:off x="2282839" y="1539918"/>
-            <a:ext cx="0" cy="9527065"/>
+            <a:ext cx="0" cy="7741868"/>
           </a:xfrm>
           <a:prstGeom prst="line">
             <a:avLst/>
@@ -5857,7 +5977,7 @@
         <p:spPr>
           <a:xfrm>
             <a:off x="2210832" y="1890608"/>
-            <a:ext cx="168205" cy="8977035"/>
+            <a:ext cx="168205" cy="7293497"/>
           </a:xfrm>
           <a:prstGeom prst="rect">
             <a:avLst/>
@@ -5895,76 +6015,6 @@
           </a:p>
         </p:txBody>
       </p:sp>
-      <p:sp>
-        <p:nvSpPr>
-          <p:cNvPr id="16" name="Rectangle 62"/>
-          <p:cNvSpPr/>
-          <p:nvPr/>
-        </p:nvSpPr>
-        <p:spPr>
-          <a:xfrm>
-            <a:off x="4098667" y="1055313"/>
-            <a:ext cx="1219200" cy="467684"/>
-          </a:xfrm>
-          <a:prstGeom prst="rect">
-            <a:avLst/>
-          </a:prstGeom>
-          <a:solidFill>
-            <a:srgbClr val="0070C0"/>
-          </a:solidFill>
-          <a:ln w="19050">
-            <a:solidFill>
-              <a:srgbClr val="0070C0"/>
-            </a:solidFill>
-          </a:ln>
-          <a:effectLst/>
-        </p:spPr>
-        <p:style>
-          <a:lnRef idx="1">
-            <a:schemeClr val="accent2"/>
-          </a:lnRef>
-          <a:fillRef idx="2">
-            <a:schemeClr val="accent2"/>
-          </a:fillRef>
-          <a:effectRef idx="1">
-            <a:schemeClr val="accent2"/>
-          </a:effectRef>
-          <a:fontRef idx="minor">
-            <a:schemeClr val="dk1"/>
-          </a:fontRef>
-        </p:style>
-        <p:txBody>
-          <a:bodyPr rtlCol="0" anchor="ctr"/>
-          <a:lstStyle/>
-          <a:p>
-            <a:pPr algn="ctr"/>
-            <a:r>
-              <a:rPr lang="en-US" sz="1600" dirty="0">
-                <a:solidFill>
-                  <a:schemeClr val="bg1"/>
-                </a:solidFill>
-              </a:rPr>
-              <a:t>:Address</a:t>
-            </a:r>
-          </a:p>
-          <a:p>
-            <a:pPr algn="ctr"/>
-            <a:r>
-              <a:rPr lang="en-US" sz="1600" dirty="0" err="1">
-                <a:solidFill>
-                  <a:schemeClr val="bg1"/>
-                </a:solidFill>
-              </a:rPr>
-              <a:t>BookParser</a:t>
-            </a:r>
-            <a:endParaRPr lang="en-US" sz="1600" dirty="0">
-              <a:solidFill>
-                <a:schemeClr val="bg1"/>
-              </a:solidFill>
-            </a:endParaRPr>
-          </a:p>
-        </p:txBody>
-      </p:sp>
       <p:cxnSp>
         <p:nvCxnSpPr>
           <p:cNvPr id="17" name="Straight Connector 16"/>
@@ -5976,7 +6026,7 @@
         <p:spPr>
           <a:xfrm>
             <a:off x="4712063" y="1539912"/>
-            <a:ext cx="0" cy="2160660"/>
+            <a:ext cx="0" cy="7546215"/>
           </a:xfrm>
           <a:prstGeom prst="line">
             <a:avLst/>
@@ -6062,8 +6112,8 @@
         </p:nvCxnSpPr>
         <p:spPr>
           <a:xfrm>
-            <a:off x="6276037" y="2245952"/>
-            <a:ext cx="0" cy="1389501"/>
+            <a:off x="6276037" y="2245949"/>
+            <a:ext cx="0" cy="6851752"/>
           </a:xfrm>
           <a:prstGeom prst="line">
             <a:avLst/>
@@ -6283,7 +6333,7 @@
           <a:p>
             <a:r>
               <a:rPr lang="en-US"/>
-              <a:t>execute()</a:t>
+              <a:t>c.execute()</a:t>
             </a:r>
           </a:p>
         </p:txBody>
@@ -6490,7 +6540,7 @@
         <p:spPr>
           <a:xfrm>
             <a:off x="10689736" y="3177915"/>
-            <a:ext cx="0" cy="7985954"/>
+            <a:ext cx="0" cy="5990308"/>
           </a:xfrm>
           <a:prstGeom prst="line">
             <a:avLst/>
@@ -6528,8 +6578,8 @@
         </p:nvCxnSpPr>
         <p:spPr>
           <a:xfrm>
-            <a:off x="8136610" y="4395514"/>
-            <a:ext cx="2454673" cy="0"/>
+            <a:off x="8037095" y="5643334"/>
+            <a:ext cx="4757578" cy="0"/>
           </a:xfrm>
           <a:prstGeom prst="straightConnector1">
             <a:avLst/>
@@ -7122,7 +7172,7 @@
                   <a:schemeClr val="bg1"/>
                 </a:solidFill>
               </a:rPr>
-              <a:t>:</a:t>
+              <a:t>c:</a:t>
             </a:r>
             <a:r>
               <a:rPr lang="en-US" sz="1600" err="1">
@@ -7132,11 +7182,6 @@
               </a:rPr>
               <a:t>PutShip</a:t>
             </a:r>
-            <a:endParaRPr lang="en-US" sz="1600">
-              <a:solidFill>
-                <a:schemeClr val="bg1"/>
-              </a:solidFill>
-            </a:endParaRPr>
           </a:p>
           <a:p>
             <a:pPr algn="ctr"/>
@@ -7170,7 +7215,7 @@
         </p:nvGrpSpPr>
         <p:grpSpPr>
           <a:xfrm>
-            <a:off x="1014788" y="10686125"/>
+            <a:off x="1014788" y="8999240"/>
             <a:ext cx="7180254" cy="384597"/>
             <a:chOff x="1014788" y="9304585"/>
             <a:chExt cx="7180254" cy="384597"/>
@@ -7452,7 +7497,7 @@
         <p:spPr>
           <a:xfrm>
             <a:off x="15148010" y="5120410"/>
-            <a:ext cx="0" cy="6043459"/>
+            <a:ext cx="0" cy="4041757"/>
           </a:xfrm>
           <a:prstGeom prst="line">
             <a:avLst/>
@@ -7496,7 +7541,7 @@
         </p:nvCxnSpPr>
         <p:spPr>
           <a:xfrm>
-            <a:off x="8139641" y="7534165"/>
+            <a:off x="8139641" y="7252455"/>
             <a:ext cx="6943840" cy="0"/>
           </a:xfrm>
           <a:prstGeom prst="straightConnector1">
@@ -7586,7 +7631,7 @@
         </p:nvCxnSpPr>
         <p:spPr>
           <a:xfrm>
-            <a:off x="8139641" y="5312796"/>
+            <a:off x="8139641" y="4912774"/>
             <a:ext cx="2457450" cy="0"/>
           </a:xfrm>
           <a:prstGeom prst="straightConnector1">
@@ -7630,10 +7675,10 @@
         </p:nvGrpSpPr>
         <p:grpSpPr>
           <a:xfrm>
-            <a:off x="8101702" y="9887058"/>
-            <a:ext cx="1503265" cy="826953"/>
+            <a:off x="8101702" y="8214766"/>
+            <a:ext cx="1416985" cy="826953"/>
             <a:chOff x="8101702" y="11497197"/>
-            <a:chExt cx="1503265" cy="826953"/>
+            <a:chExt cx="1416985" cy="826953"/>
           </a:xfrm>
         </p:grpSpPr>
         <p:grpSp>
@@ -7650,10 +7695,10 @@
           </p:nvGrpSpPr>
           <p:grpSpPr>
             <a:xfrm>
-              <a:off x="8617424" y="11497197"/>
-              <a:ext cx="987543" cy="826953"/>
-              <a:chOff x="14256889" y="4659447"/>
-              <a:chExt cx="1312860" cy="826953"/>
+              <a:off x="8503127" y="11497197"/>
+              <a:ext cx="1015560" cy="826953"/>
+              <a:chOff x="14104936" y="4659447"/>
+              <a:chExt cx="1350106" cy="826953"/>
             </a:xfrm>
           </p:grpSpPr>
           <p:sp>
@@ -7670,8 +7715,8 @@
             </p:nvSpPr>
             <p:spPr>
               <a:xfrm>
-                <a:off x="14256889" y="4659447"/>
-                <a:ext cx="1312860" cy="516104"/>
+                <a:off x="14104936" y="4659447"/>
+                <a:ext cx="1350106" cy="516104"/>
               </a:xfrm>
               <a:prstGeom prst="rect">
                 <a:avLst/>
@@ -7746,7 +7791,7 @@
             </p:nvSpPr>
             <p:spPr>
               <a:xfrm>
-                <a:off x="14878497" y="5179667"/>
+                <a:off x="14726544" y="5179667"/>
                 <a:ext cx="138546" cy="186603"/>
               </a:xfrm>
               <a:prstGeom prst="rect">
@@ -7802,7 +7847,7 @@
             </p:nvCxnSpPr>
             <p:spPr>
               <a:xfrm flipH="1">
-                <a:off x="14947769" y="5179667"/>
+                <a:off x="14795816" y="5179667"/>
                 <a:ext cx="1" cy="306733"/>
               </a:xfrm>
               <a:prstGeom prst="line">
@@ -7849,7 +7894,7 @@
           <p:spPr>
             <a:xfrm>
               <a:off x="8101702" y="11768510"/>
-              <a:ext cx="504238" cy="0"/>
+              <a:ext cx="408453" cy="0"/>
             </a:xfrm>
             <a:prstGeom prst="straightConnector1">
               <a:avLst/>
@@ -7893,7 +7938,7 @@
           <p:spPr>
             <a:xfrm>
               <a:off x="8126766" y="12195533"/>
-              <a:ext cx="1048305" cy="0"/>
+              <a:ext cx="850180" cy="0"/>
             </a:xfrm>
             <a:prstGeom prst="straightConnector1">
               <a:avLst/>
@@ -7937,7 +7982,7 @@
         </p:nvSpPr>
         <p:spPr>
           <a:xfrm>
-            <a:off x="350104" y="11361872"/>
+            <a:off x="350104" y="9466799"/>
             <a:ext cx="9254858" cy="430887"/>
           </a:xfrm>
           <a:prstGeom prst="rect">
@@ -8024,7 +8069,7 @@
         <p:spPr>
           <a:xfrm>
             <a:off x="15062479" y="7063992"/>
-            <a:ext cx="145369" cy="481344"/>
+            <a:ext cx="145369" cy="195790"/>
           </a:xfrm>
           <a:prstGeom prst="rect">
             <a:avLst/>
@@ -8323,226 +8368,6 @@
           </a:p>
         </p:txBody>
       </p:sp>
-      <p:grpSp>
-        <p:nvGrpSpPr>
-          <p:cNvPr id="92" name="Group 91">
-            <a:extLst>
-              <a:ext uri="{FF2B5EF4-FFF2-40B4-BE49-F238E27FC236}">
-                <a16:creationId xmlns:a16="http://schemas.microsoft.com/office/drawing/2014/main" id="{3AA08EFA-5D9D-094D-BDAB-554B6FF1EABB}"/>
-              </a:ext>
-            </a:extLst>
-          </p:cNvPr>
-          <p:cNvGrpSpPr/>
-          <p:nvPr/>
-        </p:nvGrpSpPr>
-        <p:grpSpPr>
-          <a:xfrm>
-            <a:off x="8114549" y="5451774"/>
-            <a:ext cx="1549580" cy="604906"/>
-            <a:chOff x="8114549" y="4612325"/>
-            <a:chExt cx="1549580" cy="604906"/>
-          </a:xfrm>
-        </p:grpSpPr>
-        <p:cxnSp>
-          <p:nvCxnSpPr>
-            <p:cNvPr id="101" name="Curved Connector 100">
-              <a:extLst>
-                <a:ext uri="{FF2B5EF4-FFF2-40B4-BE49-F238E27FC236}">
-                  <a16:creationId xmlns:a16="http://schemas.microsoft.com/office/drawing/2014/main" id="{22418FEE-65E6-B344-B202-9F7771C0F208}"/>
-                </a:ext>
-              </a:extLst>
-            </p:cNvPr>
-            <p:cNvCxnSpPr>
-              <a:cxnSpLocks/>
-            </p:cNvCxnSpPr>
-            <p:nvPr/>
-          </p:nvCxnSpPr>
-          <p:spPr>
-            <a:xfrm>
-              <a:off x="8129095" y="4853840"/>
-              <a:ext cx="134988" cy="109955"/>
-            </a:xfrm>
-            <a:prstGeom prst="curvedConnector3">
-              <a:avLst>
-                <a:gd name="adj1" fmla="val 291588"/>
-              </a:avLst>
-            </a:prstGeom>
-            <a:ln>
-              <a:solidFill>
-                <a:srgbClr val="0070C0"/>
-              </a:solidFill>
-              <a:tailEnd type="triangle"/>
-            </a:ln>
-          </p:spPr>
-          <p:style>
-            <a:lnRef idx="1">
-              <a:schemeClr val="accent1"/>
-            </a:lnRef>
-            <a:fillRef idx="0">
-              <a:schemeClr val="accent1"/>
-            </a:fillRef>
-            <a:effectRef idx="0">
-              <a:schemeClr val="accent1"/>
-            </a:effectRef>
-            <a:fontRef idx="minor">
-              <a:schemeClr val="tx1"/>
-            </a:fontRef>
-          </p:style>
-        </p:cxnSp>
-        <p:sp>
-          <p:nvSpPr>
-            <p:cNvPr id="102" name="Rectangle 101">
-              <a:extLst>
-                <a:ext uri="{FF2B5EF4-FFF2-40B4-BE49-F238E27FC236}">
-                  <a16:creationId xmlns:a16="http://schemas.microsoft.com/office/drawing/2014/main" id="{6A64BBFD-F360-4345-AC45-8FC9B6DB61D0}"/>
-                </a:ext>
-              </a:extLst>
-            </p:cNvPr>
-            <p:cNvSpPr/>
-            <p:nvPr/>
-          </p:nvSpPr>
-          <p:spPr>
-            <a:xfrm>
-              <a:off x="8126367" y="4961846"/>
-              <a:ext cx="136654" cy="148227"/>
-            </a:xfrm>
-            <a:prstGeom prst="rect">
-              <a:avLst/>
-            </a:prstGeom>
-            <a:solidFill>
-              <a:srgbClr val="0070C0"/>
-            </a:solidFill>
-            <a:ln>
-              <a:solidFill>
-                <a:srgbClr val="0070C0"/>
-              </a:solidFill>
-            </a:ln>
-            <a:effectLst/>
-          </p:spPr>
-          <p:style>
-            <a:lnRef idx="1">
-              <a:schemeClr val="accent3"/>
-            </a:lnRef>
-            <a:fillRef idx="2">
-              <a:schemeClr val="accent3"/>
-            </a:fillRef>
-            <a:effectRef idx="1">
-              <a:schemeClr val="accent3"/>
-            </a:effectRef>
-            <a:fontRef idx="minor">
-              <a:schemeClr val="dk1"/>
-            </a:fontRef>
-          </p:style>
-          <p:txBody>
-            <a:bodyPr rtlCol="0" anchor="ctr"/>
-            <a:lstStyle/>
-            <a:p>
-              <a:pPr algn="ctr"/>
-              <a:endParaRPr lang="en-SG" sz="1400"/>
-            </a:p>
-          </p:txBody>
-        </p:sp>
-        <p:cxnSp>
-          <p:nvCxnSpPr>
-            <p:cNvPr id="103" name="Curved Connector 12">
-              <a:extLst>
-                <a:ext uri="{FF2B5EF4-FFF2-40B4-BE49-F238E27FC236}">
-                  <a16:creationId xmlns:a16="http://schemas.microsoft.com/office/drawing/2014/main" id="{220AF7B3-934B-E24A-9172-2C909103CF1D}"/>
-                </a:ext>
-              </a:extLst>
-            </p:cNvPr>
-            <p:cNvCxnSpPr>
-              <a:cxnSpLocks/>
-            </p:cNvCxnSpPr>
-            <p:nvPr/>
-          </p:nvCxnSpPr>
-          <p:spPr>
-            <a:xfrm rot="10800000" flipV="1">
-              <a:off x="8135714" y="5108984"/>
-              <a:ext cx="127009" cy="108247"/>
-            </a:xfrm>
-            <a:prstGeom prst="curvedConnector3">
-              <a:avLst>
-                <a:gd name="adj1" fmla="val -216834"/>
-              </a:avLst>
-            </a:prstGeom>
-            <a:ln>
-              <a:solidFill>
-                <a:srgbClr val="0070C0"/>
-              </a:solidFill>
-              <a:prstDash val="sysDash"/>
-              <a:tailEnd type="triangle"/>
-            </a:ln>
-          </p:spPr>
-          <p:style>
-            <a:lnRef idx="1">
-              <a:schemeClr val="accent1"/>
-            </a:lnRef>
-            <a:fillRef idx="0">
-              <a:schemeClr val="accent1"/>
-            </a:fillRef>
-            <a:effectRef idx="0">
-              <a:schemeClr val="accent1"/>
-            </a:effectRef>
-            <a:fontRef idx="minor">
-              <a:schemeClr val="tx1"/>
-            </a:fontRef>
-          </p:style>
-        </p:cxnSp>
-        <p:sp>
-          <p:nvSpPr>
-            <p:cNvPr id="104" name="TextBox 103">
-              <a:extLst>
-                <a:ext uri="{FF2B5EF4-FFF2-40B4-BE49-F238E27FC236}">
-                  <a16:creationId xmlns:a16="http://schemas.microsoft.com/office/drawing/2014/main" id="{5E40F979-1494-C947-A85A-217E0C38A9AD}"/>
-                </a:ext>
-              </a:extLst>
-            </p:cNvPr>
-            <p:cNvSpPr txBox="1"/>
-            <p:nvPr/>
-          </p:nvSpPr>
-          <p:spPr>
-            <a:xfrm>
-              <a:off x="8114549" y="4612325"/>
-              <a:ext cx="1549580" cy="169277"/>
-            </a:xfrm>
-            <a:prstGeom prst="rect">
-              <a:avLst/>
-            </a:prstGeom>
-            <a:noFill/>
-            <a:ln>
-              <a:noFill/>
-            </a:ln>
-          </p:spPr>
-          <p:txBody>
-            <a:bodyPr wrap="square" lIns="0" tIns="0" rIns="0" bIns="0" rtlCol="0">
-              <a:spAutoFit/>
-            </a:bodyPr>
-            <a:lstStyle>
-              <a:defPPr>
-                <a:defRPr lang="en-US"/>
-              </a:defPPr>
-              <a:lvl1pPr algn="r">
-                <a:defRPr sz="1400">
-                  <a:solidFill>
-                    <a:srgbClr val="0070C0"/>
-                  </a:solidFill>
-                </a:defRPr>
-              </a:lvl1pPr>
-            </a:lstStyle>
-            <a:p>
-              <a:r>
-                <a:rPr lang="en-US" sz="1100" err="1"/>
-                <a:t>checkEnoughBattleships</a:t>
-              </a:r>
-              <a:r>
-                <a:rPr lang="en-US" sz="1100"/>
-                <a:t>()</a:t>
-              </a:r>
-            </a:p>
-          </p:txBody>
-        </p:sp>
-      </p:grpSp>
       <p:cxnSp>
         <p:nvCxnSpPr>
           <p:cNvPr id="108" name="Straight Arrow Connector 107">
@@ -8559,7 +8384,7 @@
         </p:nvCxnSpPr>
         <p:spPr>
           <a:xfrm>
-            <a:off x="10719664" y="4907584"/>
+            <a:off x="10719664" y="4510542"/>
             <a:ext cx="1488227" cy="1"/>
           </a:xfrm>
           <a:prstGeom prst="straightConnector1">
@@ -8673,7 +8498,7 @@
         <p:spPr>
           <a:xfrm>
             <a:off x="12245097" y="3396542"/>
-            <a:ext cx="0" cy="7780974"/>
+            <a:ext cx="0" cy="5759569"/>
           </a:xfrm>
           <a:prstGeom prst="line">
             <a:avLst/>
@@ -8720,7 +8545,7 @@
         </p:nvCxnSpPr>
         <p:spPr>
           <a:xfrm>
-            <a:off x="10756964" y="5187447"/>
+            <a:off x="10756964" y="4790405"/>
             <a:ext cx="1450927" cy="0"/>
           </a:xfrm>
           <a:prstGeom prst="straightConnector1">
@@ -8767,7 +8592,7 @@
         </p:nvSpPr>
         <p:spPr>
           <a:xfrm>
-            <a:off x="11042494" y="4671004"/>
+            <a:off x="11042494" y="4273962"/>
             <a:ext cx="1034931" cy="184666"/>
           </a:xfrm>
           <a:prstGeom prst="rect">
@@ -8834,7 +8659,7 @@
         </p:nvSpPr>
         <p:spPr>
           <a:xfrm>
-            <a:off x="10884554" y="4991905"/>
+            <a:off x="10884554" y="4594863"/>
             <a:ext cx="1175496" cy="184666"/>
           </a:xfrm>
           <a:prstGeom prst="rect">
@@ -8898,7 +8723,7 @@
         </p:nvSpPr>
         <p:spPr>
           <a:xfrm>
-            <a:off x="12791599" y="3839905"/>
+            <a:off x="12791599" y="5312547"/>
             <a:ext cx="1779662" cy="608671"/>
           </a:xfrm>
           <a:prstGeom prst="rect">
@@ -8984,13 +8809,14 @@
           </p:cNvPr>
           <p:cNvCxnSpPr>
             <a:cxnSpLocks/>
+            <a:stCxn id="95" idx="2"/>
           </p:cNvCxnSpPr>
           <p:nvPr/>
         </p:nvCxnSpPr>
         <p:spPr>
           <a:xfrm>
-            <a:off x="13677429" y="4315216"/>
-            <a:ext cx="0" cy="6848653"/>
+            <a:off x="13663423" y="6082145"/>
+            <a:ext cx="8265" cy="3073966"/>
           </a:xfrm>
           <a:prstGeom prst="line">
             <a:avLst/>
@@ -9033,7 +8859,7 @@
         <p:spPr>
           <a:xfrm>
             <a:off x="13578975" y="6175015"/>
-            <a:ext cx="168896" cy="529439"/>
+            <a:ext cx="168896" cy="521349"/>
           </a:xfrm>
           <a:prstGeom prst="rect">
             <a:avLst/>
@@ -9384,7 +9210,7 @@
         </p:nvGrpSpPr>
         <p:grpSpPr>
           <a:xfrm>
-            <a:off x="10747748" y="7771076"/>
+            <a:off x="10747748" y="7286444"/>
             <a:ext cx="1220038" cy="600170"/>
             <a:chOff x="10747748" y="4186692"/>
             <a:chExt cx="1220038" cy="600170"/>
@@ -9619,7 +9445,7 @@
         </p:nvSpPr>
         <p:spPr>
           <a:xfrm>
-            <a:off x="12188829" y="4893851"/>
+            <a:off x="12188829" y="4496809"/>
             <a:ext cx="129933" cy="299071"/>
           </a:xfrm>
           <a:prstGeom prst="rect">
@@ -9666,76 +9492,6 @@
       </p:sp>
       <p:sp>
         <p:nvSpPr>
-          <p:cNvPr id="147" name="TextBox 146">
-            <a:extLst>
-              <a:ext uri="{FF2B5EF4-FFF2-40B4-BE49-F238E27FC236}">
-                <a16:creationId xmlns:a16="http://schemas.microsoft.com/office/drawing/2014/main" id="{7EF6BB41-CD95-364B-BE27-9B810B72FEA8}"/>
-              </a:ext>
-            </a:extLst>
-          </p:cNvPr>
-          <p:cNvSpPr txBox="1"/>
-          <p:nvPr/>
-        </p:nvSpPr>
-        <p:spPr>
-          <a:xfrm>
-            <a:off x="8847931" y="5970209"/>
-            <a:ext cx="2332116" cy="184666"/>
-          </a:xfrm>
-          <a:prstGeom prst="rect">
-            <a:avLst/>
-          </a:prstGeom>
-          <a:noFill/>
-          <a:ln>
-            <a:noFill/>
-          </a:ln>
-        </p:spPr>
-        <p:txBody>
-          <a:bodyPr wrap="square" lIns="0" tIns="0" rIns="0" bIns="0" rtlCol="0">
-            <a:spAutoFit/>
-          </a:bodyPr>
-          <a:lstStyle>
-            <a:defPPr>
-              <a:defRPr lang="en-US"/>
-            </a:defPPr>
-            <a:lvl1pPr algn="r">
-              <a:defRPr sz="1400">
-                <a:solidFill>
-                  <a:srgbClr val="0070C0"/>
-                </a:solidFill>
-              </a:defRPr>
-            </a:lvl1pPr>
-          </a:lstStyle>
-          <a:p>
-            <a:pPr algn="ctr"/>
-            <a:r>
-              <a:rPr lang="en-US" sz="1200">
-                <a:solidFill>
-                  <a:srgbClr val="7030A0"/>
-                </a:solidFill>
-              </a:rPr>
-              <a:t>new </a:t>
-            </a:r>
-            <a:r>
-              <a:rPr lang="en-US" sz="1200" err="1">
-                <a:solidFill>
-                  <a:srgbClr val="7030A0"/>
-                </a:solidFill>
-              </a:rPr>
-              <a:t>BoundaryValueChecker</a:t>
-            </a:r>
-            <a:r>
-              <a:rPr lang="en-US" sz="1200">
-                <a:solidFill>
-                  <a:srgbClr val="7030A0"/>
-                </a:solidFill>
-              </a:rPr>
-              <a:t>()</a:t>
-            </a:r>
-          </a:p>
-        </p:txBody>
-      </p:sp>
-      <p:sp>
-        <p:nvSpPr>
           <p:cNvPr id="151" name="Rectangle 150">
             <a:extLst>
               <a:ext uri="{FF2B5EF4-FFF2-40B4-BE49-F238E27FC236}">
@@ -9748,8 +9504,8 @@
         </p:nvSpPr>
         <p:spPr>
           <a:xfrm>
-            <a:off x="10591282" y="7976394"/>
-            <a:ext cx="168896" cy="937324"/>
+            <a:off x="10591282" y="7491762"/>
+            <a:ext cx="168896" cy="539645"/>
           </a:xfrm>
           <a:prstGeom prst="rect">
             <a:avLst/>
@@ -9803,7 +9559,7 @@
         </p:nvCxnSpPr>
         <p:spPr>
           <a:xfrm>
-            <a:off x="8136610" y="7973512"/>
+            <a:off x="8136610" y="7488880"/>
             <a:ext cx="2454673" cy="0"/>
           </a:xfrm>
           <a:prstGeom prst="straightConnector1">
@@ -9847,7 +9603,250 @@
         </p:nvCxnSpPr>
         <p:spPr>
           <a:xfrm>
-            <a:off x="8139641" y="8890794"/>
+            <a:off x="8139641" y="8026080"/>
+            <a:ext cx="2546720" cy="0"/>
+          </a:xfrm>
+          <a:prstGeom prst="straightConnector1">
+            <a:avLst/>
+          </a:prstGeom>
+          <a:ln w="19050">
+            <a:solidFill>
+              <a:srgbClr val="7030A0"/>
+            </a:solidFill>
+            <a:prstDash val="sysDash"/>
+            <a:headEnd type="arrow" w="med" len="med"/>
+            <a:tailEnd type="none" w="med" len="med"/>
+          </a:ln>
+        </p:spPr>
+        <p:style>
+          <a:lnRef idx="1">
+            <a:schemeClr val="accent1"/>
+          </a:lnRef>
+          <a:fillRef idx="0">
+            <a:schemeClr val="accent1"/>
+          </a:fillRef>
+          <a:effectRef idx="0">
+            <a:schemeClr val="accent1"/>
+          </a:effectRef>
+          <a:fontRef idx="minor">
+            <a:schemeClr val="tx1"/>
+          </a:fontRef>
+        </p:style>
+      </p:cxnSp>
+      <p:sp>
+        <p:nvSpPr>
+          <p:cNvPr id="49" name="Rectangle 48"/>
+          <p:cNvSpPr/>
+          <p:nvPr/>
+        </p:nvSpPr>
+        <p:spPr>
+          <a:xfrm>
+            <a:off x="10591282" y="4384747"/>
+            <a:ext cx="168896" cy="536169"/>
+          </a:xfrm>
+          <a:prstGeom prst="rect">
+            <a:avLst/>
+          </a:prstGeom>
+          <a:solidFill>
+            <a:srgbClr val="7030A0"/>
+          </a:solidFill>
+          <a:ln>
+            <a:solidFill>
+              <a:srgbClr val="7030A0"/>
+            </a:solidFill>
+          </a:ln>
+          <a:effectLst/>
+        </p:spPr>
+        <p:style>
+          <a:lnRef idx="1">
+            <a:schemeClr val="accent3"/>
+          </a:lnRef>
+          <a:fillRef idx="2">
+            <a:schemeClr val="accent3"/>
+          </a:fillRef>
+          <a:effectRef idx="1">
+            <a:schemeClr val="accent3"/>
+          </a:effectRef>
+          <a:fontRef idx="minor">
+            <a:schemeClr val="dk1"/>
+          </a:fontRef>
+        </p:style>
+        <p:txBody>
+          <a:bodyPr rtlCol="0" anchor="ctr"/>
+          <a:lstStyle/>
+          <a:p>
+            <a:pPr algn="ctr"/>
+            <a:endParaRPr lang="en-SG" sz="1400"/>
+          </a:p>
+        </p:txBody>
+      </p:sp>
+      <p:sp>
+        <p:nvSpPr>
+          <p:cNvPr id="95" name="Rectangle 94">
+            <a:extLst>
+              <a:ext uri="{FF2B5EF4-FFF2-40B4-BE49-F238E27FC236}">
+                <a16:creationId xmlns:a16="http://schemas.microsoft.com/office/drawing/2014/main" id="{9499F6F2-4A04-9047-8D5A-2FD1F6DD311F}"/>
+              </a:ext>
+            </a:extLst>
+          </p:cNvPr>
+          <p:cNvSpPr/>
+          <p:nvPr/>
+        </p:nvSpPr>
+        <p:spPr>
+          <a:xfrm>
+            <a:off x="13578975" y="5908103"/>
+            <a:ext cx="168896" cy="174042"/>
+          </a:xfrm>
+          <a:prstGeom prst="rect">
+            <a:avLst/>
+          </a:prstGeom>
+          <a:solidFill>
+            <a:srgbClr val="7030A0"/>
+          </a:solidFill>
+          <a:ln>
+            <a:solidFill>
+              <a:srgbClr val="7030A0"/>
+            </a:solidFill>
+          </a:ln>
+          <a:effectLst/>
+        </p:spPr>
+        <p:style>
+          <a:lnRef idx="1">
+            <a:schemeClr val="accent3"/>
+          </a:lnRef>
+          <a:fillRef idx="2">
+            <a:schemeClr val="accent3"/>
+          </a:fillRef>
+          <a:effectRef idx="1">
+            <a:schemeClr val="accent3"/>
+          </a:effectRef>
+          <a:fontRef idx="minor">
+            <a:schemeClr val="dk1"/>
+          </a:fontRef>
+        </p:style>
+        <p:txBody>
+          <a:bodyPr rtlCol="0" anchor="ctr"/>
+          <a:lstStyle/>
+          <a:p>
+            <a:pPr algn="ctr"/>
+            <a:endParaRPr lang="en-SG" sz="1400"/>
+          </a:p>
+        </p:txBody>
+      </p:sp>
+      <p:sp>
+        <p:nvSpPr>
+          <p:cNvPr id="97" name="Rectangle 96">
+            <a:extLst>
+              <a:ext uri="{FF2B5EF4-FFF2-40B4-BE49-F238E27FC236}">
+                <a16:creationId xmlns:a16="http://schemas.microsoft.com/office/drawing/2014/main" id="{4873ED37-62EB-1242-BD75-3C7E57E41172}"/>
+              </a:ext>
+            </a:extLst>
+          </p:cNvPr>
+          <p:cNvSpPr/>
+          <p:nvPr/>
+        </p:nvSpPr>
+        <p:spPr>
+          <a:xfrm>
+            <a:off x="10591282" y="5154989"/>
+            <a:ext cx="168896" cy="297222"/>
+          </a:xfrm>
+          <a:prstGeom prst="rect">
+            <a:avLst/>
+          </a:prstGeom>
+          <a:solidFill>
+            <a:srgbClr val="7030A0"/>
+          </a:solidFill>
+          <a:ln>
+            <a:solidFill>
+              <a:srgbClr val="7030A0"/>
+            </a:solidFill>
+          </a:ln>
+          <a:effectLst/>
+        </p:spPr>
+        <p:style>
+          <a:lnRef idx="1">
+            <a:schemeClr val="accent3"/>
+          </a:lnRef>
+          <a:fillRef idx="2">
+            <a:schemeClr val="accent3"/>
+          </a:fillRef>
+          <a:effectRef idx="1">
+            <a:schemeClr val="accent3"/>
+          </a:effectRef>
+          <a:fontRef idx="minor">
+            <a:schemeClr val="dk1"/>
+          </a:fontRef>
+        </p:style>
+        <p:txBody>
+          <a:bodyPr rtlCol="0" anchor="ctr"/>
+          <a:lstStyle/>
+          <a:p>
+            <a:pPr algn="ctr"/>
+            <a:endParaRPr lang="en-SG" sz="1400"/>
+          </a:p>
+        </p:txBody>
+      </p:sp>
+      <p:cxnSp>
+        <p:nvCxnSpPr>
+          <p:cNvPr id="99" name="Straight Arrow Connector 98">
+            <a:extLst>
+              <a:ext uri="{FF2B5EF4-FFF2-40B4-BE49-F238E27FC236}">
+                <a16:creationId xmlns:a16="http://schemas.microsoft.com/office/drawing/2014/main" id="{FEFC6A07-EAC7-D04C-BA68-56DCED02C5D2}"/>
+              </a:ext>
+            </a:extLst>
+          </p:cNvPr>
+          <p:cNvCxnSpPr>
+            <a:cxnSpLocks/>
+          </p:cNvCxnSpPr>
+          <p:nvPr/>
+        </p:nvCxnSpPr>
+        <p:spPr>
+          <a:xfrm>
+            <a:off x="8136610" y="5154989"/>
+            <a:ext cx="2454673" cy="0"/>
+          </a:xfrm>
+          <a:prstGeom prst="straightConnector1">
+            <a:avLst/>
+          </a:prstGeom>
+          <a:ln w="19050">
+            <a:solidFill>
+              <a:srgbClr val="7030A0"/>
+            </a:solidFill>
+            <a:tailEnd type="arrow"/>
+          </a:ln>
+        </p:spPr>
+        <p:style>
+          <a:lnRef idx="1">
+            <a:schemeClr val="accent1"/>
+          </a:lnRef>
+          <a:fillRef idx="0">
+            <a:schemeClr val="accent1"/>
+          </a:fillRef>
+          <a:effectRef idx="0">
+            <a:schemeClr val="accent1"/>
+          </a:effectRef>
+          <a:fontRef idx="minor">
+            <a:schemeClr val="tx1"/>
+          </a:fontRef>
+        </p:style>
+      </p:cxnSp>
+      <p:cxnSp>
+        <p:nvCxnSpPr>
+          <p:cNvPr id="100" name="Straight Arrow Connector 99">
+            <a:extLst>
+              <a:ext uri="{FF2B5EF4-FFF2-40B4-BE49-F238E27FC236}">
+                <a16:creationId xmlns:a16="http://schemas.microsoft.com/office/drawing/2014/main" id="{4C797AB4-53E0-DC4C-9150-011C43CE8065}"/>
+              </a:ext>
+            </a:extLst>
+          </p:cNvPr>
+          <p:cNvCxnSpPr>
+            <a:cxnSpLocks/>
+          </p:cNvCxnSpPr>
+          <p:nvPr/>
+        </p:nvCxnSpPr>
+        <p:spPr>
+          <a:xfrm>
+            <a:off x="8139641" y="5446067"/>
             <a:ext cx="2457450" cy="0"/>
           </a:xfrm>
           <a:prstGeom prst="straightConnector1">
@@ -9879,14 +9878,163 @@
       </p:cxnSp>
       <p:sp>
         <p:nvSpPr>
+          <p:cNvPr id="105" name="TextBox 104">
+            <a:extLst>
+              <a:ext uri="{FF2B5EF4-FFF2-40B4-BE49-F238E27FC236}">
+                <a16:creationId xmlns:a16="http://schemas.microsoft.com/office/drawing/2014/main" id="{5202EE9D-B570-F048-97B0-1128F3AFF2E9}"/>
+              </a:ext>
+            </a:extLst>
+          </p:cNvPr>
+          <p:cNvSpPr txBox="1"/>
+          <p:nvPr/>
+        </p:nvSpPr>
+        <p:spPr>
+          <a:xfrm>
+            <a:off x="8272675" y="4978270"/>
+            <a:ext cx="2332116" cy="184666"/>
+          </a:xfrm>
+          <a:prstGeom prst="rect">
+            <a:avLst/>
+          </a:prstGeom>
+          <a:noFill/>
+          <a:ln>
+            <a:noFill/>
+          </a:ln>
+        </p:spPr>
+        <p:txBody>
+          <a:bodyPr wrap="square" lIns="0" tIns="0" rIns="0" bIns="0" rtlCol="0">
+            <a:spAutoFit/>
+          </a:bodyPr>
+          <a:lstStyle>
+            <a:defPPr>
+              <a:defRPr lang="en-US"/>
+            </a:defPPr>
+            <a:lvl1pPr algn="r">
+              <a:defRPr sz="1400">
+                <a:solidFill>
+                  <a:srgbClr val="0070C0"/>
+                </a:solidFill>
+              </a:defRPr>
+            </a:lvl1pPr>
+          </a:lstStyle>
+          <a:p>
+            <a:pPr algn="ctr"/>
+            <a:r>
+              <a:rPr lang="en-US" sz="1200" err="1">
+                <a:solidFill>
+                  <a:srgbClr val="7030A0"/>
+                </a:solidFill>
+              </a:rPr>
+              <a:t>isEnoughBattleships(battleship, 1)</a:t>
+            </a:r>
+            <a:endParaRPr lang="en-US" sz="1200">
+              <a:solidFill>
+                <a:srgbClr val="7030A0"/>
+              </a:solidFill>
+            </a:endParaRPr>
+          </a:p>
+        </p:txBody>
+      </p:sp>
+      <p:cxnSp>
+        <p:nvCxnSpPr>
+          <p:cNvPr id="107" name="Straight Arrow Connector 106">
+            <a:extLst>
+              <a:ext uri="{FF2B5EF4-FFF2-40B4-BE49-F238E27FC236}">
+                <a16:creationId xmlns:a16="http://schemas.microsoft.com/office/drawing/2014/main" id="{A901C160-EAAB-B84F-A3CB-29327EB10D48}"/>
+              </a:ext>
+            </a:extLst>
+          </p:cNvPr>
+          <p:cNvCxnSpPr>
+            <a:cxnSpLocks/>
+          </p:cNvCxnSpPr>
+          <p:nvPr/>
+        </p:nvCxnSpPr>
+        <p:spPr>
+          <a:xfrm>
+            <a:off x="8139641" y="6078321"/>
+            <a:ext cx="5520941" cy="0"/>
+          </a:xfrm>
+          <a:prstGeom prst="straightConnector1">
+            <a:avLst/>
+          </a:prstGeom>
+          <a:ln w="19050">
+            <a:solidFill>
+              <a:srgbClr val="7030A0"/>
+            </a:solidFill>
+            <a:prstDash val="sysDash"/>
+            <a:headEnd type="arrow" w="med" len="med"/>
+            <a:tailEnd type="none" w="med" len="med"/>
+          </a:ln>
+        </p:spPr>
+        <p:style>
+          <a:lnRef idx="1">
+            <a:schemeClr val="accent1"/>
+          </a:lnRef>
+          <a:fillRef idx="0">
+            <a:schemeClr val="accent1"/>
+          </a:fillRef>
+          <a:effectRef idx="0">
+            <a:schemeClr val="accent1"/>
+          </a:effectRef>
+          <a:fontRef idx="minor">
+            <a:schemeClr val="tx1"/>
+          </a:fontRef>
+        </p:style>
+      </p:cxnSp>
+      <p:cxnSp>
+        <p:nvCxnSpPr>
+          <p:cNvPr id="92" name="Straight Arrow Connector 91">
+            <a:extLst>
+              <a:ext uri="{FF2B5EF4-FFF2-40B4-BE49-F238E27FC236}">
+                <a16:creationId xmlns:a16="http://schemas.microsoft.com/office/drawing/2014/main" id="{BB3190FB-CC68-A046-AA74-31A0A577EAE8}"/>
+              </a:ext>
+            </a:extLst>
+          </p:cNvPr>
+          <p:cNvCxnSpPr>
+            <a:cxnSpLocks/>
+          </p:cNvCxnSpPr>
+          <p:nvPr/>
+        </p:nvCxnSpPr>
+        <p:spPr>
+          <a:xfrm>
+            <a:off x="7994590" y="4387872"/>
+            <a:ext cx="2606906" cy="0"/>
+          </a:xfrm>
+          <a:prstGeom prst="straightConnector1">
+            <a:avLst/>
+          </a:prstGeom>
+          <a:ln w="19050">
+            <a:solidFill>
+              <a:srgbClr val="7030A0"/>
+            </a:solidFill>
+            <a:tailEnd type="arrow"/>
+          </a:ln>
+        </p:spPr>
+        <p:style>
+          <a:lnRef idx="1">
+            <a:schemeClr val="accent1"/>
+          </a:lnRef>
+          <a:fillRef idx="0">
+            <a:schemeClr val="accent1"/>
+          </a:fillRef>
+          <a:effectRef idx="0">
+            <a:schemeClr val="accent1"/>
+          </a:effectRef>
+          <a:fontRef idx="minor">
+            <a:schemeClr val="tx1"/>
+          </a:fontRef>
+        </p:style>
+      </p:cxnSp>
+      <p:sp>
+        <p:nvSpPr>
           <p:cNvPr id="65" name="Rectangle 64"/>
           <p:cNvSpPr/>
           <p:nvPr/>
         </p:nvSpPr>
         <p:spPr>
           <a:xfrm>
-            <a:off x="7965180" y="3824796"/>
-            <a:ext cx="169682" cy="6866295"/>
+            <a:off x="7965180" y="3824797"/>
+            <a:ext cx="169682" cy="5180307"/>
           </a:xfrm>
           <a:prstGeom prst="rect">
             <a:avLst/>
@@ -9926,37 +10074,43 @@
       </p:sp>
       <p:sp>
         <p:nvSpPr>
-          <p:cNvPr id="49" name="Rectangle 48"/>
+          <p:cNvPr id="122" name="Rectangle 62">
+            <a:extLst>
+              <a:ext uri="{FF2B5EF4-FFF2-40B4-BE49-F238E27FC236}">
+                <a16:creationId xmlns:a16="http://schemas.microsoft.com/office/drawing/2014/main" id="{CFEC3571-1124-E34D-85CF-1856E29D0A87}"/>
+              </a:ext>
+            </a:extLst>
+          </p:cNvPr>
           <p:cNvSpPr/>
           <p:nvPr/>
         </p:nvSpPr>
         <p:spPr>
           <a:xfrm>
-            <a:off x="10591282" y="4384747"/>
-            <a:ext cx="168896" cy="937324"/>
+            <a:off x="3782115" y="1176238"/>
+            <a:ext cx="1941791" cy="346760"/>
           </a:xfrm>
           <a:prstGeom prst="rect">
             <a:avLst/>
           </a:prstGeom>
           <a:solidFill>
-            <a:srgbClr val="7030A0"/>
+            <a:srgbClr val="0070C0"/>
           </a:solidFill>
-          <a:ln>
+          <a:ln w="19050">
             <a:solidFill>
-              <a:srgbClr val="7030A0"/>
+              <a:srgbClr val="0070C0"/>
             </a:solidFill>
           </a:ln>
           <a:effectLst/>
         </p:spPr>
         <p:style>
           <a:lnRef idx="1">
-            <a:schemeClr val="accent3"/>
+            <a:schemeClr val="accent2"/>
           </a:lnRef>
           <a:fillRef idx="2">
-            <a:schemeClr val="accent3"/>
+            <a:schemeClr val="accent2"/>
           </a:fillRef>
           <a:effectRef idx="1">
-            <a:schemeClr val="accent3"/>
+            <a:schemeClr val="accent2"/>
           </a:effectRef>
           <a:fontRef idx="minor">
             <a:schemeClr val="dk1"/>
@@ -9967,7 +10121,19 @@
           <a:lstStyle/>
           <a:p>
             <a:pPr algn="ctr"/>
-            <a:endParaRPr lang="en-SG" sz="1400"/>
+            <a:r>
+              <a:rPr lang="en-US" sz="1600" dirty="0">
+                <a:solidFill>
+                  <a:schemeClr val="bg1"/>
+                </a:solidFill>
+              </a:rPr>
+              <a:t>:AddressBookParser</a:t>
+            </a:r>
+            <a:endParaRPr lang="en-SG" sz="1600" dirty="0">
+              <a:solidFill>
+                <a:schemeClr val="bg1"/>
+              </a:solidFill>
+            </a:endParaRPr>
           </a:p>
         </p:txBody>
       </p:sp>

</xml_diff>

<commit_message>
Update images for sequence diagram
</commit_message>
<xml_diff>
--- a/docs/diagrams/PutShipSequenceDiagram.pptx
+++ b/docs/diagrams/PutShipSequenceDiagram.pptx
@@ -6271,8 +6271,8 @@
           </p:nvSpPr>
           <p:spPr>
             <a:xfrm>
-              <a:off x="4897924" y="3607803"/>
-              <a:ext cx="855808" cy="215444"/>
+              <a:off x="4897924" y="3596640"/>
+              <a:ext cx="1271228" cy="215444"/>
             </a:xfrm>
             <a:prstGeom prst="rect">
               <a:avLst/>

</xml_diff>